<commit_message>
Review changes added and improvement and increase code coverage with integration testing
</commit_message>
<xml_diff>
--- a/docs/SpringbootApp.pptx
+++ b/docs/SpringbootApp.pptx
@@ -5,33 +5,34 @@
     <p:sldMasterId id="2147483757" r:id="rId1"/>
   </p:sldMasterIdLst>
   <p:notesMasterIdLst>
-    <p:notesMasterId r:id="rId26"/>
+    <p:notesMasterId r:id="rId27"/>
   </p:notesMasterIdLst>
   <p:sldIdLst>
     <p:sldId id="256" r:id="rId2"/>
     <p:sldId id="257" r:id="rId3"/>
-    <p:sldId id="258" r:id="rId4"/>
-    <p:sldId id="259" r:id="rId5"/>
-    <p:sldId id="261" r:id="rId6"/>
-    <p:sldId id="280" r:id="rId7"/>
-    <p:sldId id="260" r:id="rId8"/>
-    <p:sldId id="262" r:id="rId9"/>
-    <p:sldId id="263" r:id="rId10"/>
-    <p:sldId id="264" r:id="rId11"/>
-    <p:sldId id="275" r:id="rId12"/>
-    <p:sldId id="276" r:id="rId13"/>
-    <p:sldId id="265" r:id="rId14"/>
-    <p:sldId id="266" r:id="rId15"/>
-    <p:sldId id="267" r:id="rId16"/>
-    <p:sldId id="269" r:id="rId17"/>
-    <p:sldId id="271" r:id="rId18"/>
-    <p:sldId id="272" r:id="rId19"/>
-    <p:sldId id="273" r:id="rId20"/>
-    <p:sldId id="274" r:id="rId21"/>
-    <p:sldId id="277" r:id="rId22"/>
-    <p:sldId id="279" r:id="rId23"/>
-    <p:sldId id="281" r:id="rId24"/>
-    <p:sldId id="278" r:id="rId25"/>
+    <p:sldId id="282" r:id="rId4"/>
+    <p:sldId id="258" r:id="rId5"/>
+    <p:sldId id="259" r:id="rId6"/>
+    <p:sldId id="261" r:id="rId7"/>
+    <p:sldId id="280" r:id="rId8"/>
+    <p:sldId id="260" r:id="rId9"/>
+    <p:sldId id="262" r:id="rId10"/>
+    <p:sldId id="263" r:id="rId11"/>
+    <p:sldId id="264" r:id="rId12"/>
+    <p:sldId id="275" r:id="rId13"/>
+    <p:sldId id="276" r:id="rId14"/>
+    <p:sldId id="265" r:id="rId15"/>
+    <p:sldId id="266" r:id="rId16"/>
+    <p:sldId id="267" r:id="rId17"/>
+    <p:sldId id="269" r:id="rId18"/>
+    <p:sldId id="271" r:id="rId19"/>
+    <p:sldId id="272" r:id="rId20"/>
+    <p:sldId id="273" r:id="rId21"/>
+    <p:sldId id="274" r:id="rId22"/>
+    <p:sldId id="277" r:id="rId23"/>
+    <p:sldId id="279" r:id="rId24"/>
+    <p:sldId id="281" r:id="rId25"/>
+    <p:sldId id="278" r:id="rId26"/>
   </p:sldIdLst>
   <p:sldSz cx="12192000" cy="6858000"/>
   <p:notesSz cx="6858000" cy="9144000"/>
@@ -130,6 +131,11 @@
       </a:defRPr>
     </a:lvl9pPr>
   </p:defaultTextStyle>
+  <p:extLst>
+    <p:ext uri="{EFAFB233-063F-42B5-8137-9DF3F51BA10A}">
+      <p15:sldGuideLst xmlns:p15="http://schemas.microsoft.com/office/powerpoint/2012/main"/>
+    </p:ext>
+  </p:extLst>
 </p:presentation>
 </file>
 
@@ -215,7 +221,7 @@
           <a:p>
             <a:fld id="{BE76FB0F-1925-4F8B-99E3-F9DD463CABE8}" type="datetimeFigureOut">
               <a:rPr lang="en-US" smtClean="0"/>
-              <a:t>12/20/2020</a:t>
+              <a:t>1/14/2021</a:t>
             </a:fld>
             <a:endParaRPr lang="en-US"/>
           </a:p>
@@ -548,7 +554,7 @@
           <a:p>
             <a:fld id="{D6E3E519-7AB5-488B-9FD7-8027A9986C52}" type="slidenum">
               <a:rPr lang="en-US" smtClean="0"/>
-              <a:t>3</a:t>
+              <a:t>4</a:t>
             </a:fld>
             <a:endParaRPr lang="en-US"/>
           </a:p>
@@ -1289,7 +1295,7 @@
           <a:p>
             <a:fld id="{4389A4A3-4C68-45E7-BB7A-8D4D37744778}" type="datetimeFigureOut">
               <a:rPr lang="en-US" smtClean="0"/>
-              <a:t>12/20/2020</a:t>
+              <a:t>1/14/2021</a:t>
             </a:fld>
             <a:endParaRPr lang="en-US"/>
           </a:p>
@@ -1540,7 +1546,7 @@
           <a:p>
             <a:fld id="{4389A4A3-4C68-45E7-BB7A-8D4D37744778}" type="datetimeFigureOut">
               <a:rPr lang="en-US" smtClean="0"/>
-              <a:t>12/20/2020</a:t>
+              <a:t>1/14/2021</a:t>
             </a:fld>
             <a:endParaRPr lang="en-US"/>
           </a:p>
@@ -1854,7 +1860,7 @@
           <a:p>
             <a:fld id="{4389A4A3-4C68-45E7-BB7A-8D4D37744778}" type="datetimeFigureOut">
               <a:rPr lang="en-US" smtClean="0"/>
-              <a:t>12/20/2020</a:t>
+              <a:t>1/14/2021</a:t>
             </a:fld>
             <a:endParaRPr lang="en-US"/>
           </a:p>
@@ -2195,7 +2201,7 @@
           <a:p>
             <a:fld id="{4389A4A3-4C68-45E7-BB7A-8D4D37744778}" type="datetimeFigureOut">
               <a:rPr lang="en-US" smtClean="0"/>
-              <a:t>12/20/2020</a:t>
+              <a:t>1/14/2021</a:t>
             </a:fld>
             <a:endParaRPr lang="en-US"/>
           </a:p>
@@ -2509,7 +2515,7 @@
           <a:p>
             <a:fld id="{4389A4A3-4C68-45E7-BB7A-8D4D37744778}" type="datetimeFigureOut">
               <a:rPr lang="en-US" smtClean="0"/>
-              <a:t>12/20/2020</a:t>
+              <a:t>1/14/2021</a:t>
             </a:fld>
             <a:endParaRPr lang="en-US"/>
           </a:p>
@@ -2902,7 +2908,7 @@
           <a:p>
             <a:fld id="{4389A4A3-4C68-45E7-BB7A-8D4D37744778}" type="datetimeFigureOut">
               <a:rPr lang="en-US" smtClean="0"/>
-              <a:t>12/20/2020</a:t>
+              <a:t>1/14/2021</a:t>
             </a:fld>
             <a:endParaRPr lang="en-US"/>
           </a:p>
@@ -3072,7 +3078,7 @@
           <a:p>
             <a:fld id="{4389A4A3-4C68-45E7-BB7A-8D4D37744778}" type="datetimeFigureOut">
               <a:rPr lang="en-US" smtClean="0"/>
-              <a:t>12/20/2020</a:t>
+              <a:t>1/14/2021</a:t>
             </a:fld>
             <a:endParaRPr lang="en-US"/>
           </a:p>
@@ -3252,7 +3258,7 @@
           <a:p>
             <a:fld id="{4389A4A3-4C68-45E7-BB7A-8D4D37744778}" type="datetimeFigureOut">
               <a:rPr lang="en-US" smtClean="0"/>
-              <a:t>12/20/2020</a:t>
+              <a:t>1/14/2021</a:t>
             </a:fld>
             <a:endParaRPr lang="en-US"/>
           </a:p>
@@ -3428,7 +3434,7 @@
           <a:p>
             <a:fld id="{4389A4A3-4C68-45E7-BB7A-8D4D37744778}" type="datetimeFigureOut">
               <a:rPr lang="en-US" smtClean="0"/>
-              <a:t>12/20/2020</a:t>
+              <a:t>1/14/2021</a:t>
             </a:fld>
             <a:endParaRPr lang="en-US"/>
           </a:p>
@@ -3675,7 +3681,7 @@
           <a:p>
             <a:fld id="{4389A4A3-4C68-45E7-BB7A-8D4D37744778}" type="datetimeFigureOut">
               <a:rPr lang="en-US" smtClean="0"/>
-              <a:t>12/20/2020</a:t>
+              <a:t>1/14/2021</a:t>
             </a:fld>
             <a:endParaRPr lang="en-US"/>
           </a:p>
@@ -3907,7 +3913,7 @@
           <a:p>
             <a:fld id="{4389A4A3-4C68-45E7-BB7A-8D4D37744778}" type="datetimeFigureOut">
               <a:rPr lang="en-US" smtClean="0"/>
-              <a:t>12/20/2020</a:t>
+              <a:t>1/14/2021</a:t>
             </a:fld>
             <a:endParaRPr lang="en-US"/>
           </a:p>
@@ -4281,7 +4287,7 @@
           <a:p>
             <a:fld id="{4389A4A3-4C68-45E7-BB7A-8D4D37744778}" type="datetimeFigureOut">
               <a:rPr lang="en-US" smtClean="0"/>
-              <a:t>12/20/2020</a:t>
+              <a:t>1/14/2021</a:t>
             </a:fld>
             <a:endParaRPr lang="en-US"/>
           </a:p>
@@ -4404,7 +4410,7 @@
           <a:p>
             <a:fld id="{4389A4A3-4C68-45E7-BB7A-8D4D37744778}" type="datetimeFigureOut">
               <a:rPr lang="en-US" smtClean="0"/>
-              <a:t>12/20/2020</a:t>
+              <a:t>1/14/2021</a:t>
             </a:fld>
             <a:endParaRPr lang="en-US"/>
           </a:p>
@@ -4499,7 +4505,7 @@
           <a:p>
             <a:fld id="{4389A4A3-4C68-45E7-BB7A-8D4D37744778}" type="datetimeFigureOut">
               <a:rPr lang="en-US" smtClean="0"/>
-              <a:t>12/20/2020</a:t>
+              <a:t>1/14/2021</a:t>
             </a:fld>
             <a:endParaRPr lang="en-US"/>
           </a:p>
@@ -4754,7 +4760,7 @@
           <a:p>
             <a:fld id="{4389A4A3-4C68-45E7-BB7A-8D4D37744778}" type="datetimeFigureOut">
               <a:rPr lang="en-US" smtClean="0"/>
-              <a:t>12/20/2020</a:t>
+              <a:t>1/14/2021</a:t>
             </a:fld>
             <a:endParaRPr lang="en-US"/>
           </a:p>
@@ -5017,7 +5023,7 @@
           <a:p>
             <a:fld id="{4389A4A3-4C68-45E7-BB7A-8D4D37744778}" type="datetimeFigureOut">
               <a:rPr lang="en-US" smtClean="0"/>
-              <a:t>12/20/2020</a:t>
+              <a:t>1/14/2021</a:t>
             </a:fld>
             <a:endParaRPr lang="en-US"/>
           </a:p>
@@ -5760,7 +5766,7 @@
           <a:p>
             <a:fld id="{4389A4A3-4C68-45E7-BB7A-8D4D37744778}" type="datetimeFigureOut">
               <a:rPr lang="en-US" smtClean="0"/>
-              <a:t>12/20/2020</a:t>
+              <a:t>1/14/2021</a:t>
             </a:fld>
             <a:endParaRPr lang="en-US"/>
           </a:p>
@@ -6309,7 +6315,19 @@
                   </a:outerShdw>
                 </a:effectLst>
               </a:rPr>
-              <a:t>Spring Boot Challenge Application</a:t>
+              <a:t>Spring Boot </a:t>
+            </a:r>
+            <a:r>
+              <a:rPr lang="en-US" dirty="0" smtClean="0">
+                <a:effectLst>
+                  <a:outerShdw blurRad="38100" dist="38100" dir="2700000" algn="tl">
+                    <a:srgbClr val="000000">
+                      <a:alpha val="43137"/>
+                    </a:srgbClr>
+                  </a:outerShdw>
+                </a:effectLst>
+              </a:rPr>
+              <a:t>production Ready Application</a:t>
             </a:r>
             <a:endParaRPr lang="en-US" dirty="0">
               <a:effectLst>
@@ -6335,7 +6353,9 @@
         </p:nvSpPr>
         <p:spPr/>
         <p:txBody>
-          <a:bodyPr/>
+          <a:bodyPr>
+            <a:normAutofit lnSpcReduction="10000"/>
+          </a:bodyPr>
           <a:lstStyle/>
           <a:p>
             <a:r>
@@ -6348,12 +6368,25 @@
               <a:rPr lang="en-US" dirty="0" smtClean="0">
                 <a:hlinkClick r:id="rId2"/>
               </a:rPr>
-              <a:t>Vaibhav.h.patil@gmail.com</a:t>
+              <a:t>Email -v</a:t>
+            </a:r>
+            <a:r>
+              <a:rPr lang="en-US" dirty="0" smtClean="0">
+                <a:hlinkClick r:id="rId2"/>
+              </a:rPr>
+              <a:t>aibhav.h.patil@gmail.com</a:t>
             </a:r>
             <a:r>
               <a:rPr lang="en-US" dirty="0" smtClean="0"/>
               <a:t> </a:t>
             </a:r>
+          </a:p>
+          <a:p>
+            <a:r>
+              <a:rPr lang="en-US" dirty="0" smtClean="0"/>
+              <a:t>Version 1.1</a:t>
+            </a:r>
+            <a:endParaRPr lang="en-US" dirty="0" smtClean="0"/>
           </a:p>
           <a:p>
             <a:endParaRPr lang="en-US" dirty="0"/>
@@ -6381,6 +6414,246 @@
 </file>
 
 <file path=ppt/slides/slide10.xml><?xml version="1.0" encoding="utf-8"?>
+<p:sld xmlns:a="http://schemas.openxmlformats.org/drawingml/2006/main" xmlns:r="http://schemas.openxmlformats.org/officeDocument/2006/relationships" xmlns:p="http://schemas.openxmlformats.org/presentationml/2006/main">
+  <p:cSld>
+    <p:spTree>
+      <p:nvGrpSpPr>
+        <p:cNvPr id="1" name=""/>
+        <p:cNvGrpSpPr/>
+        <p:nvPr/>
+      </p:nvGrpSpPr>
+      <p:grpSpPr>
+        <a:xfrm>
+          <a:off x="0" y="0"/>
+          <a:ext cx="0" cy="0"/>
+          <a:chOff x="0" y="0"/>
+          <a:chExt cx="0" cy="0"/>
+        </a:xfrm>
+      </p:grpSpPr>
+      <p:sp>
+        <p:nvSpPr>
+          <p:cNvPr id="2" name="Title 1"/>
+          <p:cNvSpPr>
+            <a:spLocks noGrp="1"/>
+          </p:cNvSpPr>
+          <p:nvPr>
+            <p:ph type="title"/>
+          </p:nvPr>
+        </p:nvSpPr>
+        <p:spPr/>
+        <p:txBody>
+          <a:bodyPr/>
+          <a:lstStyle/>
+          <a:p>
+            <a:r>
+              <a:rPr lang="en-US" dirty="0"/>
+              <a:t>Dev Build, Release, Run</a:t>
+            </a:r>
+          </a:p>
+        </p:txBody>
+      </p:sp>
+      <p:sp>
+        <p:nvSpPr>
+          <p:cNvPr id="3" name="Content Placeholder 2"/>
+          <p:cNvSpPr>
+            <a:spLocks noGrp="1"/>
+          </p:cNvSpPr>
+          <p:nvPr>
+            <p:ph idx="1"/>
+          </p:nvPr>
+        </p:nvSpPr>
+        <p:spPr/>
+        <p:txBody>
+          <a:bodyPr>
+            <a:normAutofit/>
+          </a:bodyPr>
+          <a:lstStyle/>
+          <a:p>
+            <a:r>
+              <a:rPr lang="en-US" dirty="0" smtClean="0"/>
+              <a:t>Step 3. </a:t>
+            </a:r>
+            <a:r>
+              <a:rPr lang="en-US" dirty="0" err="1" smtClean="0"/>
+              <a:t>Kubernates</a:t>
+            </a:r>
+            <a:r>
+              <a:rPr lang="en-US" dirty="0" smtClean="0"/>
+              <a:t> deployment using local </a:t>
+            </a:r>
+            <a:r>
+              <a:rPr lang="en-US" dirty="0" err="1" smtClean="0"/>
+              <a:t>Minikube</a:t>
+            </a:r>
+            <a:r>
+              <a:rPr lang="en-US" dirty="0" smtClean="0"/>
+              <a:t> cluster </a:t>
+            </a:r>
+          </a:p>
+          <a:p>
+            <a:pPr marL="0" indent="0">
+              <a:buNone/>
+            </a:pPr>
+            <a:r>
+              <a:rPr lang="en-US" dirty="0" smtClean="0">
+                <a:solidFill>
+                  <a:srgbClr val="000000"/>
+                </a:solidFill>
+                <a:latin typeface="Inconsolata"/>
+              </a:rPr>
+              <a:t>Application has deployment folder in future we can add different configuration and setting per environment to easily cover configuration aspect of cloud native app development </a:t>
+            </a:r>
+          </a:p>
+          <a:p>
+            <a:pPr marL="0" indent="0">
+              <a:buNone/>
+            </a:pPr>
+            <a:r>
+              <a:rPr lang="en-US" dirty="0" smtClean="0">
+                <a:solidFill>
+                  <a:srgbClr val="000000"/>
+                </a:solidFill>
+                <a:latin typeface="Inconsolata"/>
+              </a:rPr>
+              <a:t>After setup and locally running </a:t>
+            </a:r>
+            <a:r>
+              <a:rPr lang="en-US" dirty="0" err="1">
+                <a:solidFill>
+                  <a:srgbClr val="000000"/>
+                </a:solidFill>
+                <a:latin typeface="Inconsolata"/>
+              </a:rPr>
+              <a:t>M</a:t>
+            </a:r>
+            <a:r>
+              <a:rPr lang="en-US" dirty="0" err="1" smtClean="0">
+                <a:solidFill>
+                  <a:srgbClr val="000000"/>
+                </a:solidFill>
+                <a:latin typeface="Inconsolata"/>
+              </a:rPr>
+              <a:t>inikube</a:t>
+            </a:r>
+            <a:r>
+              <a:rPr lang="en-US" dirty="0" smtClean="0">
+                <a:solidFill>
+                  <a:srgbClr val="000000"/>
+                </a:solidFill>
+                <a:latin typeface="Inconsolata"/>
+              </a:rPr>
+              <a:t> cluster below command executed to deploy app in cluster environment </a:t>
+            </a:r>
+          </a:p>
+          <a:p>
+            <a:r>
+              <a:rPr lang="en-US" dirty="0" smtClean="0">
+                <a:solidFill>
+                  <a:srgbClr val="000000"/>
+                </a:solidFill>
+                <a:latin typeface="Inconsolata"/>
+              </a:rPr>
+              <a:t>1. </a:t>
+            </a:r>
+            <a:r>
+              <a:rPr lang="en-US" dirty="0" err="1" smtClean="0">
+                <a:solidFill>
+                  <a:srgbClr val="000000"/>
+                </a:solidFill>
+                <a:latin typeface="Inconsolata"/>
+              </a:rPr>
+              <a:t>kubernates</a:t>
+            </a:r>
+            <a:r>
+              <a:rPr lang="en-US" dirty="0" smtClean="0">
+                <a:solidFill>
+                  <a:srgbClr val="000000"/>
+                </a:solidFill>
+                <a:latin typeface="Inconsolata"/>
+              </a:rPr>
+              <a:t> deployment </a:t>
+            </a:r>
+          </a:p>
+          <a:p>
+            <a:r>
+              <a:rPr lang="en-US" dirty="0" smtClean="0">
+                <a:solidFill>
+                  <a:srgbClr val="000000"/>
+                </a:solidFill>
+                <a:latin typeface="Inconsolata"/>
+              </a:rPr>
+              <a:t>2. Run application using service </a:t>
+            </a:r>
+            <a:endParaRPr lang="en-US" dirty="0">
+              <a:solidFill>
+                <a:srgbClr val="000000"/>
+              </a:solidFill>
+              <a:latin typeface="Inconsolata"/>
+            </a:endParaRPr>
+          </a:p>
+          <a:p>
+            <a:endParaRPr lang="en-US" dirty="0"/>
+          </a:p>
+        </p:txBody>
+      </p:sp>
+      <p:pic>
+        <p:nvPicPr>
+          <p:cNvPr id="4" name="Picture 3"/>
+          <p:cNvPicPr>
+            <a:picLocks noChangeAspect="1"/>
+          </p:cNvPicPr>
+          <p:nvPr/>
+        </p:nvPicPr>
+        <p:blipFill>
+          <a:blip r:embed="rId2"/>
+          <a:stretch>
+            <a:fillRect/>
+          </a:stretch>
+        </p:blipFill>
+        <p:spPr>
+          <a:xfrm>
+            <a:off x="1209675" y="5055398"/>
+            <a:ext cx="6610350" cy="1697827"/>
+          </a:xfrm>
+          <a:prstGeom prst="roundRect">
+            <a:avLst>
+              <a:gd name="adj" fmla="val 8594"/>
+            </a:avLst>
+          </a:prstGeom>
+          <a:solidFill>
+            <a:srgbClr val="FFFFFF">
+              <a:shade val="85000"/>
+            </a:srgbClr>
+          </a:solidFill>
+          <a:ln>
+            <a:noFill/>
+          </a:ln>
+          <a:effectLst>
+            <a:reflection blurRad="12700" stA="38000" endPos="28000" dist="5000" dir="5400000" sy="-100000" algn="bl" rotWithShape="0"/>
+          </a:effectLst>
+        </p:spPr>
+      </p:pic>
+    </p:spTree>
+    <p:extLst>
+      <p:ext uri="{BB962C8B-B14F-4D97-AF65-F5344CB8AC3E}">
+        <p14:creationId xmlns:p14="http://schemas.microsoft.com/office/powerpoint/2010/main" val="1822290849"/>
+      </p:ext>
+    </p:extLst>
+  </p:cSld>
+  <p:clrMapOvr>
+    <a:masterClrMapping/>
+  </p:clrMapOvr>
+  <p:timing>
+    <p:tnLst>
+      <p:par>
+        <p:cTn id="1" dur="indefinite" restart="never" nodeType="tmRoot"/>
+      </p:par>
+    </p:tnLst>
+  </p:timing>
+</p:sld>
+</file>
+
+<file path=ppt/slides/slide11.xml><?xml version="1.0" encoding="utf-8"?>
 <p:sld xmlns:a="http://schemas.openxmlformats.org/drawingml/2006/main" xmlns:r="http://schemas.openxmlformats.org/officeDocument/2006/relationships" xmlns:p="http://schemas.openxmlformats.org/presentationml/2006/main">
   <p:cSld>
     <p:spTree>
@@ -6521,7 +6794,7 @@
 </p:sld>
 </file>
 
-<file path=ppt/slides/slide11.xml><?xml version="1.0" encoding="utf-8"?>
+<file path=ppt/slides/slide12.xml><?xml version="1.0" encoding="utf-8"?>
 <p:sld xmlns:a="http://schemas.openxmlformats.org/drawingml/2006/main" xmlns:r="http://schemas.openxmlformats.org/officeDocument/2006/relationships" xmlns:p="http://schemas.openxmlformats.org/presentationml/2006/main">
   <p:cSld>
     <p:spTree>
@@ -6726,7 +6999,7 @@
 </p:sld>
 </file>
 
-<file path=ppt/slides/slide12.xml><?xml version="1.0" encoding="utf-8"?>
+<file path=ppt/slides/slide13.xml><?xml version="1.0" encoding="utf-8"?>
 <p:sld xmlns:a="http://schemas.openxmlformats.org/drawingml/2006/main" xmlns:r="http://schemas.openxmlformats.org/officeDocument/2006/relationships" xmlns:p="http://schemas.openxmlformats.org/presentationml/2006/main">
   <p:cSld>
     <p:spTree>
@@ -6906,7 +7179,7 @@
 </p:sld>
 </file>
 
-<file path=ppt/slides/slide13.xml><?xml version="1.0" encoding="utf-8"?>
+<file path=ppt/slides/slide14.xml><?xml version="1.0" encoding="utf-8"?>
 <p:sld xmlns:a="http://schemas.openxmlformats.org/drawingml/2006/main" xmlns:r="http://schemas.openxmlformats.org/officeDocument/2006/relationships" xmlns:p="http://schemas.openxmlformats.org/presentationml/2006/main">
   <p:cSld>
     <p:spTree>
@@ -7097,7 +7370,7 @@
 </p:sld>
 </file>
 
-<file path=ppt/slides/slide14.xml><?xml version="1.0" encoding="utf-8"?>
+<file path=ppt/slides/slide15.xml><?xml version="1.0" encoding="utf-8"?>
 <p:sld xmlns:a="http://schemas.openxmlformats.org/drawingml/2006/main" xmlns:r="http://schemas.openxmlformats.org/officeDocument/2006/relationships" xmlns:p="http://schemas.openxmlformats.org/presentationml/2006/main">
   <p:cSld>
     <p:spTree>
@@ -7483,7 +7756,7 @@
 </p:sld>
 </file>
 
-<file path=ppt/slides/slide15.xml><?xml version="1.0" encoding="utf-8"?>
+<file path=ppt/slides/slide16.xml><?xml version="1.0" encoding="utf-8"?>
 <p:sld xmlns:a="http://schemas.openxmlformats.org/drawingml/2006/main" xmlns:r="http://schemas.openxmlformats.org/officeDocument/2006/relationships" xmlns:p="http://schemas.openxmlformats.org/presentationml/2006/main">
   <p:cSld>
     <p:spTree>
@@ -7638,7 +7911,7 @@
 </p:sld>
 </file>
 
-<file path=ppt/slides/slide16.xml><?xml version="1.0" encoding="utf-8"?>
+<file path=ppt/slides/slide17.xml><?xml version="1.0" encoding="utf-8"?>
 <p:sld xmlns:a="http://schemas.openxmlformats.org/drawingml/2006/main" xmlns:r="http://schemas.openxmlformats.org/officeDocument/2006/relationships" xmlns:p="http://schemas.openxmlformats.org/presentationml/2006/main">
   <p:cSld>
     <p:spTree>
@@ -7818,7 +8091,7 @@
 </p:sld>
 </file>
 
-<file path=ppt/slides/slide17.xml><?xml version="1.0" encoding="utf-8"?>
+<file path=ppt/slides/slide18.xml><?xml version="1.0" encoding="utf-8"?>
 <p:sld xmlns:a="http://schemas.openxmlformats.org/drawingml/2006/main" xmlns:r="http://schemas.openxmlformats.org/officeDocument/2006/relationships" xmlns:p="http://schemas.openxmlformats.org/presentationml/2006/main">
   <p:cSld>
     <p:spTree>
@@ -7905,6 +8178,42 @@
               <a:rPr lang="en-US" b="1" i="1" u="sng" dirty="0" smtClean="0"/>
               <a:t>3 Find JUNIT code coverage result </a:t>
             </a:r>
+            <a:endParaRPr lang="en-US" b="1" i="1" u="sng" dirty="0" smtClean="0"/>
+          </a:p>
+          <a:p>
+            <a:pPr marL="0" indent="0" fontAlgn="t">
+              <a:buNone/>
+            </a:pPr>
+            <a:r>
+              <a:rPr lang="en-US" b="1" i="1" dirty="0" smtClean="0"/>
+              <a:t>Used Junit MVC mock to test service and Integration test approach used to test REST APIS</a:t>
+            </a:r>
+          </a:p>
+          <a:p>
+            <a:pPr marL="0" indent="0" fontAlgn="t">
+              <a:buNone/>
+            </a:pPr>
+            <a:r>
+              <a:rPr lang="en-US" b="1" i="1" dirty="0" smtClean="0"/>
+              <a:t>Find dev execution results on </a:t>
+            </a:r>
+            <a:r>
+              <a:rPr lang="en-US" b="1" i="1" dirty="0" err="1" smtClean="0"/>
+              <a:t>git</a:t>
+            </a:r>
+            <a:r>
+              <a:rPr lang="en-US" b="1" i="1" dirty="0"/>
+              <a:t> under /</a:t>
+            </a:r>
+            <a:r>
+              <a:rPr lang="en-US" b="1" i="1" dirty="0" smtClean="0"/>
+              <a:t>dev/</a:t>
+            </a:r>
+            <a:r>
+              <a:rPr lang="en-US" b="1" i="1" dirty="0" err="1" smtClean="0"/>
+              <a:t>code_coverage_report</a:t>
+            </a:r>
+            <a:endParaRPr lang="en-US" b="1" i="1" dirty="0" smtClean="0"/>
           </a:p>
           <a:p>
             <a:pPr marL="0" indent="0" fontAlgn="t">
@@ -7938,7 +8247,7 @@
                   </a:outerShdw>
                 </a:effectLst>
               </a:rPr>
-              <a:t>78.3</a:t>
+              <a:t>80</a:t>
             </a:r>
             <a:r>
               <a:rPr lang="en-US" b="1" i="1" spc="-150" dirty="0" smtClean="0">
@@ -7953,7 +8262,22 @@
                   </a:outerShdw>
                 </a:effectLst>
               </a:rPr>
-              <a:t>% code coverage can be extend to 100% easily</a:t>
+              <a:t>% </a:t>
+            </a:r>
+            <a:r>
+              <a:rPr lang="en-US" b="1" i="1" spc="-150" dirty="0" smtClean="0">
+                <a:solidFill>
+                  <a:srgbClr val="002060"/>
+                </a:solidFill>
+                <a:effectLst>
+                  <a:outerShdw blurRad="38100" dist="38100" dir="2700000" algn="tl">
+                    <a:srgbClr val="000000">
+                      <a:alpha val="43137"/>
+                    </a:srgbClr>
+                  </a:outerShdw>
+                </a:effectLst>
+              </a:rPr>
+              <a:t>code coverage can be extend to 100% easily</a:t>
             </a:r>
             <a:endParaRPr lang="en-US" b="1" i="1" spc="-150" dirty="0">
               <a:solidFill>
@@ -7982,7 +8306,7 @@
       </p:sp>
       <p:pic>
         <p:nvPicPr>
-          <p:cNvPr id="3" name="Picture 2"/>
+          <p:cNvPr id="5" name="Picture 4"/>
           <p:cNvPicPr>
             <a:picLocks noChangeAspect="1"/>
           </p:cNvPicPr>
@@ -7996,25 +8320,12 @@
         </p:blipFill>
         <p:spPr>
           <a:xfrm>
-            <a:off x="1183369" y="3118623"/>
-            <a:ext cx="6184178" cy="3240418"/>
+            <a:off x="959370" y="4024593"/>
+            <a:ext cx="8009208" cy="2511118"/>
           </a:xfrm>
-          <a:prstGeom prst="roundRect">
-            <a:avLst>
-              <a:gd name="adj" fmla="val 8594"/>
-            </a:avLst>
+          <a:prstGeom prst="rect">
+            <a:avLst/>
           </a:prstGeom>
-          <a:solidFill>
-            <a:srgbClr val="FFFFFF">
-              <a:shade val="85000"/>
-            </a:srgbClr>
-          </a:solidFill>
-          <a:ln>
-            <a:noFill/>
-          </a:ln>
-          <a:effectLst>
-            <a:reflection blurRad="12700" stA="38000" endPos="28000" dist="5000" dir="5400000" sy="-100000" algn="bl" rotWithShape="0"/>
-          </a:effectLst>
         </p:spPr>
       </p:pic>
     </p:spTree>
@@ -8037,7 +8348,7 @@
 </p:sld>
 </file>
 
-<file path=ppt/slides/slide18.xml><?xml version="1.0" encoding="utf-8"?>
+<file path=ppt/slides/slide19.xml><?xml version="1.0" encoding="utf-8"?>
 <p:sld xmlns:a="http://schemas.openxmlformats.org/drawingml/2006/main" xmlns:r="http://schemas.openxmlformats.org/officeDocument/2006/relationships" xmlns:p="http://schemas.openxmlformats.org/presentationml/2006/main">
   <p:cSld>
     <p:spTree>
@@ -8241,320 +8552,6 @@
 </p:sld>
 </file>
 
-<file path=ppt/slides/slide19.xml><?xml version="1.0" encoding="utf-8"?>
-<p:sld xmlns:a="http://schemas.openxmlformats.org/drawingml/2006/main" xmlns:r="http://schemas.openxmlformats.org/officeDocument/2006/relationships" xmlns:p="http://schemas.openxmlformats.org/presentationml/2006/main">
-  <p:cSld>
-    <p:spTree>
-      <p:nvGrpSpPr>
-        <p:cNvPr id="1" name=""/>
-        <p:cNvGrpSpPr/>
-        <p:nvPr/>
-      </p:nvGrpSpPr>
-      <p:grpSpPr>
-        <a:xfrm>
-          <a:off x="0" y="0"/>
-          <a:ext cx="0" cy="0"/>
-          <a:chOff x="0" y="0"/>
-          <a:chExt cx="0" cy="0"/>
-        </a:xfrm>
-      </p:grpSpPr>
-      <p:sp>
-        <p:nvSpPr>
-          <p:cNvPr id="2" name="Title 1"/>
-          <p:cNvSpPr>
-            <a:spLocks noGrp="1"/>
-          </p:cNvSpPr>
-          <p:nvPr>
-            <p:ph type="title"/>
-          </p:nvPr>
-        </p:nvSpPr>
-        <p:spPr/>
-        <p:txBody>
-          <a:bodyPr/>
-          <a:lstStyle/>
-          <a:p>
-            <a:r>
-              <a:rPr lang="en-US" dirty="0"/>
-              <a:t>Future enhancements </a:t>
-            </a:r>
-            <a:br>
-              <a:rPr lang="en-US" dirty="0"/>
-            </a:br>
-            <a:r>
-              <a:rPr lang="en-US" dirty="0" smtClean="0"/>
-              <a:t> </a:t>
-            </a:r>
-            <a:endParaRPr lang="en-US" dirty="0"/>
-          </a:p>
-        </p:txBody>
-      </p:sp>
-      <p:sp>
-        <p:nvSpPr>
-          <p:cNvPr id="4" name="Content Placeholder 3"/>
-          <p:cNvSpPr>
-            <a:spLocks noGrp="1"/>
-          </p:cNvSpPr>
-          <p:nvPr>
-            <p:ph idx="1"/>
-          </p:nvPr>
-        </p:nvSpPr>
-        <p:spPr>
-          <a:xfrm>
-            <a:off x="677334" y="1596571"/>
-            <a:ext cx="8829524" cy="5261429"/>
-          </a:xfrm>
-        </p:spPr>
-        <p:txBody>
-          <a:bodyPr>
-            <a:normAutofit/>
-          </a:bodyPr>
-          <a:lstStyle/>
-          <a:p>
-            <a:pPr marL="0" indent="0">
-              <a:buNone/>
-            </a:pPr>
-            <a:r>
-              <a:rPr lang="en-US" dirty="0" smtClean="0"/>
-              <a:t>Below are list feature improvement items we can consider to make our application cloud native and can support 12 factors of micros vice application.</a:t>
-            </a:r>
-          </a:p>
-          <a:p>
-            <a:pPr>
-              <a:buFont typeface="+mj-lt"/>
-              <a:buAutoNum type="arabicPeriod"/>
-            </a:pPr>
-            <a:r>
-              <a:rPr lang="en-US" dirty="0" smtClean="0"/>
-              <a:t>Add security aspects and align application security with global standards.- </a:t>
-            </a:r>
-            <a:r>
-              <a:rPr lang="en-US" b="1" u="sng" dirty="0" smtClean="0">
-                <a:effectLst>
-                  <a:outerShdw blurRad="38100" dist="38100" dir="2700000" algn="tl">
-                    <a:srgbClr val="000000">
-                      <a:alpha val="43137"/>
-                    </a:srgbClr>
-                  </a:outerShdw>
-                </a:effectLst>
-              </a:rPr>
-              <a:t>Secure by design </a:t>
-            </a:r>
-          </a:p>
-          <a:p>
-            <a:pPr>
-              <a:buFont typeface="Wingdings" panose="05000000000000000000" pitchFamily="2" charset="2"/>
-              <a:buChar char="§"/>
-            </a:pPr>
-            <a:r>
-              <a:rPr lang="en-US" dirty="0" smtClean="0"/>
-              <a:t>Use and integrated security scan tools with CI/CD integration. Also we can utilize cloud provided security scan tools</a:t>
-            </a:r>
-          </a:p>
-          <a:p>
-            <a:pPr>
-              <a:buFont typeface="Wingdings" panose="05000000000000000000" pitchFamily="2" charset="2"/>
-              <a:buChar char="§"/>
-            </a:pPr>
-            <a:r>
-              <a:rPr lang="en-US" dirty="0"/>
-              <a:t>Support </a:t>
-            </a:r>
-            <a:r>
-              <a:rPr lang="en-US" b="1" dirty="0"/>
-              <a:t>Prod profile </a:t>
-            </a:r>
-            <a:r>
-              <a:rPr lang="en-US" dirty="0"/>
-              <a:t>setting in application using standard practices </a:t>
-            </a:r>
-          </a:p>
-          <a:p>
-            <a:pPr marL="0" indent="0">
-              <a:buNone/>
-            </a:pPr>
-            <a:r>
-              <a:rPr lang="en-US" dirty="0">
-                <a:hlinkClick r:id="rId2"/>
-              </a:rPr>
-              <a:t>https://tomgregory.com/how-to-measure-code-coverage-using-sonarqube-and-jacoco</a:t>
-            </a:r>
-            <a:r>
-              <a:rPr lang="en-US" dirty="0" smtClean="0">
-                <a:hlinkClick r:id="rId2"/>
-              </a:rPr>
-              <a:t>/</a:t>
-            </a:r>
-            <a:r>
-              <a:rPr lang="en-US" dirty="0" smtClean="0"/>
-              <a:t> </a:t>
-            </a:r>
-          </a:p>
-          <a:p>
-            <a:pPr marL="0" indent="0">
-              <a:buNone/>
-            </a:pPr>
-            <a:r>
-              <a:rPr lang="en-US" dirty="0">
-                <a:hlinkClick r:id="rId3"/>
-              </a:rPr>
-              <a:t>https://</a:t>
-            </a:r>
-            <a:r>
-              <a:rPr lang="en-US" dirty="0" smtClean="0">
-                <a:hlinkClick r:id="rId3"/>
-              </a:rPr>
-              <a:t>cloud.google.com/security/infrastructure</a:t>
-            </a:r>
-            <a:r>
-              <a:rPr lang="en-US" dirty="0" smtClean="0"/>
-              <a:t> </a:t>
-            </a:r>
-          </a:p>
-          <a:p>
-            <a:r>
-              <a:rPr lang="en-US" dirty="0" smtClean="0"/>
-              <a:t>Use </a:t>
-            </a:r>
-            <a:r>
-              <a:rPr lang="en-US" dirty="0"/>
-              <a:t>JWT or authentication service as per requirement and enforce authorization in service, develop or encryption service to securely transfer data.</a:t>
-            </a:r>
-          </a:p>
-          <a:p>
-            <a:pPr marL="0" indent="0">
-              <a:buNone/>
-            </a:pPr>
-            <a:r>
-              <a:rPr lang="en-US" dirty="0" smtClean="0"/>
-              <a:t>2. </a:t>
-            </a:r>
-            <a:r>
-              <a:rPr lang="en-US" b="1" dirty="0" smtClean="0"/>
-              <a:t>Integrate service to APM</a:t>
-            </a:r>
-            <a:r>
-              <a:rPr lang="en-US" dirty="0" smtClean="0"/>
-              <a:t> (application performance and monitoring </a:t>
-            </a:r>
-            <a:r>
-              <a:rPr lang="en-US" dirty="0"/>
-              <a:t>) and </a:t>
-            </a:r>
-            <a:r>
-              <a:rPr lang="en-US" b="1" dirty="0">
-                <a:effectLst>
-                  <a:outerShdw blurRad="38100" dist="38100" dir="2700000" algn="tl">
-                    <a:srgbClr val="000000">
-                      <a:alpha val="43137"/>
-                    </a:srgbClr>
-                  </a:outerShdw>
-                </a:effectLst>
-              </a:rPr>
-              <a:t>Monitor, troubleshoot, and improve application </a:t>
-            </a:r>
-            <a:r>
-              <a:rPr lang="en-US" b="1" dirty="0" smtClean="0">
-                <a:effectLst>
-                  <a:outerShdw blurRad="38100" dist="38100" dir="2700000" algn="tl">
-                    <a:srgbClr val="000000">
-                      <a:alpha val="43137"/>
-                    </a:srgbClr>
-                  </a:outerShdw>
-                </a:effectLst>
-              </a:rPr>
-              <a:t>performance</a:t>
-            </a:r>
-            <a:r>
-              <a:rPr lang="en-US" dirty="0" smtClean="0"/>
-              <a:t>.</a:t>
-            </a:r>
-          </a:p>
-          <a:p>
-            <a:pPr marL="0" indent="0">
-              <a:buNone/>
-            </a:pPr>
-            <a:r>
-              <a:rPr lang="en-US" dirty="0" smtClean="0"/>
-              <a:t>Couple of option we can select depends on our requirement (manage/in house )</a:t>
-            </a:r>
-          </a:p>
-          <a:p>
-            <a:pPr marL="0" indent="0">
-              <a:buNone/>
-            </a:pPr>
-            <a:endParaRPr lang="en-US" dirty="0" smtClean="0"/>
-          </a:p>
-          <a:p>
-            <a:pPr marL="0" indent="0">
-              <a:buNone/>
-            </a:pPr>
-            <a:endParaRPr lang="en-US" dirty="0" smtClean="0"/>
-          </a:p>
-          <a:p>
-            <a:pPr marL="0" indent="0">
-              <a:buNone/>
-            </a:pPr>
-            <a:endParaRPr lang="en-US" dirty="0" smtClean="0"/>
-          </a:p>
-          <a:p>
-            <a:pPr marL="0" indent="0">
-              <a:buNone/>
-            </a:pPr>
-            <a:endParaRPr lang="en-US" dirty="0" smtClean="0"/>
-          </a:p>
-          <a:p>
-            <a:pPr marL="0" indent="0">
-              <a:buNone/>
-            </a:pPr>
-            <a:endParaRPr lang="en-US" dirty="0" smtClean="0"/>
-          </a:p>
-          <a:p>
-            <a:pPr marL="0" indent="0">
-              <a:buNone/>
-            </a:pPr>
-            <a:endParaRPr lang="en-US" dirty="0"/>
-          </a:p>
-          <a:p>
-            <a:pPr marL="0" indent="0">
-              <a:buNone/>
-            </a:pPr>
-            <a:endParaRPr lang="en-US" dirty="0" smtClean="0"/>
-          </a:p>
-          <a:p>
-            <a:pPr>
-              <a:buFont typeface="+mj-lt"/>
-              <a:buAutoNum type="arabicPeriod"/>
-            </a:pPr>
-            <a:endParaRPr lang="en-US" dirty="0" smtClean="0"/>
-          </a:p>
-          <a:p>
-            <a:pPr marL="0" indent="0" fontAlgn="t">
-              <a:buNone/>
-            </a:pPr>
-            <a:endParaRPr lang="en-US" b="1" i="1" u="sng" dirty="0" smtClean="0"/>
-          </a:p>
-        </p:txBody>
-      </p:sp>
-    </p:spTree>
-    <p:extLst>
-      <p:ext uri="{BB962C8B-B14F-4D97-AF65-F5344CB8AC3E}">
-        <p14:creationId xmlns:p14="http://schemas.microsoft.com/office/powerpoint/2010/main" val="1050529957"/>
-      </p:ext>
-    </p:extLst>
-  </p:cSld>
-  <p:clrMapOvr>
-    <a:masterClrMapping/>
-  </p:clrMapOvr>
-  <p:timing>
-    <p:tnLst>
-      <p:par>
-        <p:cTn id="1" dur="indefinite" restart="never" nodeType="tmRoot"/>
-      </p:par>
-    </p:tnLst>
-  </p:timing>
-</p:sld>
-</file>
-
 <file path=ppt/slides/slide2.xml><?xml version="1.0" encoding="utf-8"?>
 <p:sld xmlns:a="http://schemas.openxmlformats.org/drawingml/2006/main" xmlns:r="http://schemas.openxmlformats.org/officeDocument/2006/relationships" xmlns:p="http://schemas.openxmlformats.org/presentationml/2006/main">
   <p:cSld>
@@ -8589,7 +8586,11 @@
           <a:p>
             <a:r>
               <a:rPr lang="en-US" dirty="0" smtClean="0"/>
-              <a:t>About </a:t>
+              <a:t>History</a:t>
+            </a:r>
+            <a:r>
+              <a:rPr lang="en-US" dirty="0" smtClean="0"/>
+              <a:t> </a:t>
             </a:r>
             <a:endParaRPr lang="en-US" dirty="0"/>
           </a:p>
@@ -8613,7 +8614,7 @@
         </p:spPr>
         <p:txBody>
           <a:bodyPr>
-            <a:normAutofit fontScale="77500" lnSpcReduction="20000"/>
+            <a:normAutofit/>
           </a:bodyPr>
           <a:lstStyle/>
           <a:p>
@@ -8622,214 +8623,226 @@
             </a:pPr>
             <a:r>
               <a:rPr lang="en-US" dirty="0" smtClean="0"/>
-              <a:t>This document can provide some </a:t>
-            </a:r>
-            <a:r>
-              <a:rPr lang="en-US" dirty="0"/>
-              <a:t>implementation </a:t>
-            </a:r>
-            <a:r>
-              <a:rPr lang="en-US" dirty="0" smtClean="0"/>
-              <a:t>details of </a:t>
-            </a:r>
-            <a:r>
-              <a:rPr lang="en-US" b="1" dirty="0" smtClean="0"/>
-              <a:t>Account Manage </a:t>
-            </a:r>
-            <a:r>
-              <a:rPr lang="en-US" dirty="0" smtClean="0"/>
-              <a:t>with</a:t>
-            </a:r>
-            <a:r>
-              <a:rPr lang="en-US" b="1" dirty="0" smtClean="0"/>
               <a:t> </a:t>
             </a:r>
-            <a:r>
-              <a:rPr lang="en-US" dirty="0" smtClean="0"/>
-              <a:t>some below points:</a:t>
-            </a:r>
-          </a:p>
-          <a:p>
-            <a:r>
-              <a:rPr lang="en-US" b="1" u="sng" dirty="0" smtClean="0">
-                <a:effectLst>
-                  <a:outerShdw blurRad="38100" dist="38100" dir="2700000" algn="tl">
-                    <a:srgbClr val="000000">
-                      <a:alpha val="43137"/>
-                    </a:srgbClr>
-                  </a:outerShdw>
-                </a:effectLst>
-              </a:rPr>
-              <a:t>Technical details</a:t>
-            </a:r>
-          </a:p>
-          <a:p>
-            <a:r>
-              <a:rPr lang="en-US" b="1" u="sng" dirty="0" smtClean="0">
-                <a:effectLst>
-                  <a:outerShdw blurRad="38100" dist="38100" dir="2700000" algn="tl">
-                    <a:srgbClr val="000000">
-                      <a:alpha val="43137"/>
-                    </a:srgbClr>
-                  </a:outerShdw>
-                </a:effectLst>
-              </a:rPr>
-              <a:t>Requirements </a:t>
-            </a:r>
-          </a:p>
-          <a:p>
-            <a:r>
-              <a:rPr lang="en-US" b="1" u="sng" dirty="0" smtClean="0">
-                <a:effectLst>
-                  <a:outerShdw blurRad="38100" dist="38100" dir="2700000" algn="tl">
-                    <a:srgbClr val="000000">
-                      <a:alpha val="43137"/>
-                    </a:srgbClr>
-                  </a:outerShdw>
-                </a:effectLst>
-              </a:rPr>
-              <a:t>Service implantation details</a:t>
-            </a:r>
-          </a:p>
-          <a:p>
-            <a:pPr lvl="1"/>
-            <a:r>
-              <a:rPr lang="en-US" b="1" u="sng" dirty="0" smtClean="0">
-                <a:effectLst>
-                  <a:outerShdw blurRad="38100" dist="38100" dir="2700000" algn="tl">
-                    <a:srgbClr val="000000">
-                      <a:alpha val="43137"/>
-                    </a:srgbClr>
-                  </a:outerShdw>
-                </a:effectLst>
-              </a:rPr>
-              <a:t>Rest API documentation </a:t>
-            </a:r>
-          </a:p>
-          <a:p>
-            <a:pPr lvl="1"/>
-            <a:r>
-              <a:rPr lang="en-US" b="1" u="sng" dirty="0" smtClean="0">
-                <a:effectLst>
-                  <a:outerShdw blurRad="38100" dist="38100" dir="2700000" algn="tl">
-                    <a:srgbClr val="000000">
-                      <a:alpha val="43137"/>
-                    </a:srgbClr>
-                  </a:outerShdw>
-                </a:effectLst>
-              </a:rPr>
-              <a:t>Dev Build, Release, Run</a:t>
-            </a:r>
-          </a:p>
-          <a:p>
-            <a:pPr lvl="1"/>
-            <a:r>
-              <a:rPr lang="en-US" b="1" u="sng" dirty="0" smtClean="0">
-                <a:effectLst>
-                  <a:outerShdw blurRad="38100" dist="38100" dir="2700000" algn="tl">
-                    <a:srgbClr val="000000">
-                      <a:alpha val="43137"/>
-                    </a:srgbClr>
-                  </a:outerShdw>
-                </a:effectLst>
-              </a:rPr>
-              <a:t>Dev Integration and cross cutting  services  </a:t>
-            </a:r>
-          </a:p>
-          <a:p>
-            <a:pPr lvl="1"/>
-            <a:r>
-              <a:rPr lang="en-US" b="1" u="sng" dirty="0" smtClean="0">
-                <a:effectLst>
-                  <a:outerShdw blurRad="38100" dist="38100" dir="2700000" algn="tl">
-                    <a:srgbClr val="000000">
-                      <a:alpha val="43137"/>
-                    </a:srgbClr>
-                  </a:outerShdw>
-                </a:effectLst>
-              </a:rPr>
-              <a:t>Development practice and reports</a:t>
-            </a:r>
-          </a:p>
-          <a:p>
-            <a:r>
-              <a:rPr lang="en-US" b="1" u="sng" dirty="0" smtClean="0">
-                <a:effectLst>
-                  <a:outerShdw blurRad="38100" dist="38100" dir="2700000" algn="tl">
-                    <a:srgbClr val="000000">
-                      <a:alpha val="43137"/>
-                    </a:srgbClr>
-                  </a:outerShdw>
-                </a:effectLst>
-              </a:rPr>
-              <a:t>Futures enhancements </a:t>
-            </a:r>
-          </a:p>
-          <a:p>
-            <a:pPr marL="0" indent="0">
-              <a:buNone/>
-            </a:pPr>
-            <a:r>
-              <a:rPr lang="en-US" dirty="0" smtClean="0"/>
-              <a:t> </a:t>
-            </a:r>
             <a:endParaRPr lang="en-US" dirty="0"/>
           </a:p>
         </p:txBody>
       </p:sp>
-      <p:pic>
-        <p:nvPicPr>
-          <p:cNvPr id="4" name="Picture 3"/>
-          <p:cNvPicPr>
-            <a:picLocks noChangeAspect="1"/>
-          </p:cNvPicPr>
-          <p:nvPr/>
-        </p:nvPicPr>
-        <p:blipFill rotWithShape="1">
-          <a:blip r:embed="rId2">
-            <a:extLst>
-              <a:ext uri="{BEBA8EAE-BF5A-486C-A8C5-ECC9F3942E4B}">
-                <a14:imgProps xmlns:a14="http://schemas.microsoft.com/office/drawing/2010/main">
-                  <a14:imgLayer r:embed="rId3">
-                    <a14:imgEffect>
-                      <a14:brightnessContrast bright="-20000" contrast="40000"/>
-                    </a14:imgEffect>
-                  </a14:imgLayer>
-                </a14:imgProps>
-              </a:ext>
-            </a:extLst>
-          </a:blip>
-          <a:srcRect r="2650" b="40662"/>
-          <a:stretch/>
-        </p:blipFill>
-        <p:spPr>
-          <a:xfrm>
-            <a:off x="851505" y="4383314"/>
-            <a:ext cx="8829523" cy="2373086"/>
-          </a:xfrm>
-          <a:prstGeom prst="roundRect">
-            <a:avLst>
-              <a:gd name="adj" fmla="val 8594"/>
-            </a:avLst>
-          </a:prstGeom>
-          <a:solidFill>
-            <a:srgbClr val="FFFFFF">
-              <a:shade val="85000"/>
-            </a:srgbClr>
-          </a:solidFill>
-          <a:ln>
-            <a:noFill/>
-          </a:ln>
-          <a:effectLst>
-            <a:outerShdw blurRad="50800" dist="38100" dir="5400000" algn="t" rotWithShape="0">
-              <a:prstClr val="black">
-                <a:alpha val="40000"/>
-              </a:prstClr>
-            </a:outerShdw>
-            <a:reflection blurRad="6350" stA="50000" endA="295" endPos="92000" dist="101600" dir="5400000" sy="-100000" algn="bl" rotWithShape="0"/>
-          </a:effectLst>
-        </p:spPr>
-      </p:pic>
+      <p:graphicFrame>
+        <p:nvGraphicFramePr>
+          <p:cNvPr id="6" name="Table 5"/>
+          <p:cNvGraphicFramePr>
+            <a:graphicFrameLocks noGrp="1"/>
+          </p:cNvGraphicFramePr>
+          <p:nvPr>
+            <p:extLst>
+              <p:ext uri="{D42A27DB-BD31-4B8C-83A1-F6EECF244321}">
+                <p14:modId xmlns:p14="http://schemas.microsoft.com/office/powerpoint/2010/main" val="649132408"/>
+              </p:ext>
+            </p:extLst>
+          </p:nvPr>
+        </p:nvGraphicFramePr>
+        <p:xfrm>
+          <a:off x="565192" y="1849120"/>
+          <a:ext cx="8127999" cy="1925320"/>
+        </p:xfrm>
+        <a:graphic>
+          <a:graphicData uri="http://schemas.openxmlformats.org/drawingml/2006/table">
+            <a:tbl>
+              <a:tblPr firstRow="1" bandRow="1">
+                <a:tableStyleId>{5C22544A-7EE6-4342-B048-85BDC9FD1C3A}</a:tableStyleId>
+              </a:tblPr>
+              <a:tblGrid>
+                <a:gridCol w="2709333">
+                  <a:extLst>
+                    <a:ext uri="{9D8B030D-6E8A-4147-A177-3AD203B41FA5}">
+                      <a16:colId xmlns:a16="http://schemas.microsoft.com/office/drawing/2014/main" val="2263686290"/>
+                    </a:ext>
+                  </a:extLst>
+                </a:gridCol>
+                <a:gridCol w="2709333">
+                  <a:extLst>
+                    <a:ext uri="{9D8B030D-6E8A-4147-A177-3AD203B41FA5}">
+                      <a16:colId xmlns:a16="http://schemas.microsoft.com/office/drawing/2014/main" val="2656755813"/>
+                    </a:ext>
+                  </a:extLst>
+                </a:gridCol>
+                <a:gridCol w="2709333">
+                  <a:extLst>
+                    <a:ext uri="{9D8B030D-6E8A-4147-A177-3AD203B41FA5}">
+                      <a16:colId xmlns:a16="http://schemas.microsoft.com/office/drawing/2014/main" val="1844465308"/>
+                    </a:ext>
+                  </a:extLst>
+                </a:gridCol>
+              </a:tblGrid>
+              <a:tr h="370840">
+                <a:tc>
+                  <a:txBody>
+                    <a:bodyPr/>
+                    <a:lstStyle/>
+                    <a:p>
+                      <a:r>
+                        <a:rPr lang="en-US" dirty="0" smtClean="0"/>
+                        <a:t>Release</a:t>
+                      </a:r>
+                      <a:endParaRPr lang="en-US" dirty="0"/>
+                    </a:p>
+                  </a:txBody>
+                  <a:tcPr/>
+                </a:tc>
+                <a:tc>
+                  <a:txBody>
+                    <a:bodyPr/>
+                    <a:lstStyle/>
+                    <a:p>
+                      <a:r>
+                        <a:rPr lang="en-US" dirty="0" smtClean="0"/>
+                        <a:t>History</a:t>
+                      </a:r>
+                      <a:r>
+                        <a:rPr lang="en-US" baseline="0" dirty="0" smtClean="0"/>
+                        <a:t> details</a:t>
+                      </a:r>
+                      <a:endParaRPr lang="en-US" dirty="0"/>
+                    </a:p>
+                  </a:txBody>
+                  <a:tcPr/>
+                </a:tc>
+                <a:tc>
+                  <a:txBody>
+                    <a:bodyPr/>
+                    <a:lstStyle/>
+                    <a:p>
+                      <a:r>
+                        <a:rPr lang="en-US" dirty="0" smtClean="0"/>
+                        <a:t>Date</a:t>
+                      </a:r>
+                      <a:endParaRPr lang="en-US" dirty="0"/>
+                    </a:p>
+                  </a:txBody>
+                  <a:tcPr/>
+                </a:tc>
+                <a:extLst>
+                  <a:ext uri="{0D108BD9-81ED-4DB2-BD59-A6C34878D82A}">
+                    <a16:rowId xmlns:a16="http://schemas.microsoft.com/office/drawing/2014/main" val="3270464874"/>
+                  </a:ext>
+                </a:extLst>
+              </a:tr>
+              <a:tr h="370840">
+                <a:tc>
+                  <a:txBody>
+                    <a:bodyPr/>
+                    <a:lstStyle/>
+                    <a:p>
+                      <a:r>
+                        <a:rPr lang="en-US" dirty="0" smtClean="0"/>
+                        <a:t>R1.0</a:t>
+                      </a:r>
+                      <a:endParaRPr lang="en-US" dirty="0"/>
+                    </a:p>
+                  </a:txBody>
+                  <a:tcPr/>
+                </a:tc>
+                <a:tc>
+                  <a:txBody>
+                    <a:bodyPr/>
+                    <a:lstStyle/>
+                    <a:p>
+                      <a:r>
+                        <a:rPr lang="en-US" dirty="0" smtClean="0"/>
+                        <a:t>Initial draft shared for review</a:t>
+                      </a:r>
+                      <a:endParaRPr lang="en-US" dirty="0"/>
+                    </a:p>
+                  </a:txBody>
+                  <a:tcPr/>
+                </a:tc>
+                <a:tc>
+                  <a:txBody>
+                    <a:bodyPr/>
+                    <a:lstStyle/>
+                    <a:p>
+                      <a:r>
+                        <a:rPr lang="en-US" dirty="0" smtClean="0"/>
+                        <a:t>Dec</a:t>
+                      </a:r>
+                      <a:r>
+                        <a:rPr lang="en-US" baseline="0" dirty="0" smtClean="0"/>
+                        <a:t> 30 2020</a:t>
+                      </a:r>
+                      <a:endParaRPr lang="en-US" dirty="0"/>
+                    </a:p>
+                  </a:txBody>
+                  <a:tcPr/>
+                </a:tc>
+                <a:extLst>
+                  <a:ext uri="{0D108BD9-81ED-4DB2-BD59-A6C34878D82A}">
+                    <a16:rowId xmlns:a16="http://schemas.microsoft.com/office/drawing/2014/main" val="797485994"/>
+                  </a:ext>
+                </a:extLst>
+              </a:tr>
+              <a:tr h="370840">
+                <a:tc>
+                  <a:txBody>
+                    <a:bodyPr/>
+                    <a:lstStyle/>
+                    <a:p>
+                      <a:r>
+                        <a:rPr lang="en-US" dirty="0" smtClean="0"/>
+                        <a:t>R1.1</a:t>
+                      </a:r>
+                      <a:endParaRPr lang="en-US" dirty="0"/>
+                    </a:p>
+                  </a:txBody>
+                  <a:tcPr/>
+                </a:tc>
+                <a:tc>
+                  <a:txBody>
+                    <a:bodyPr/>
+                    <a:lstStyle/>
+                    <a:p>
+                      <a:r>
+                        <a:rPr lang="en-US" dirty="0" smtClean="0"/>
+                        <a:t>Incorporated review</a:t>
+                      </a:r>
+                      <a:r>
+                        <a:rPr lang="en-US" baseline="0" dirty="0" smtClean="0"/>
+                        <a:t> comments and update test results</a:t>
+                      </a:r>
+                      <a:endParaRPr lang="en-US" dirty="0"/>
+                    </a:p>
+                  </a:txBody>
+                  <a:tcPr/>
+                </a:tc>
+                <a:tc>
+                  <a:txBody>
+                    <a:bodyPr/>
+                    <a:lstStyle/>
+                    <a:p>
+                      <a:r>
+                        <a:rPr lang="en-US" dirty="0" smtClean="0"/>
+                        <a:t>Jan 24</a:t>
+                      </a:r>
+                      <a:r>
+                        <a:rPr lang="en-US" baseline="0" dirty="0" smtClean="0"/>
+                        <a:t> 2021</a:t>
+                      </a:r>
+                      <a:endParaRPr lang="en-US" dirty="0"/>
+                    </a:p>
+                  </a:txBody>
+                  <a:tcPr/>
+                </a:tc>
+                <a:extLst>
+                  <a:ext uri="{0D108BD9-81ED-4DB2-BD59-A6C34878D82A}">
+                    <a16:rowId xmlns:a16="http://schemas.microsoft.com/office/drawing/2014/main" val="4243321382"/>
+                  </a:ext>
+                </a:extLst>
+              </a:tr>
+            </a:tbl>
+          </a:graphicData>
+        </a:graphic>
+      </p:graphicFrame>
     </p:spTree>
     <p:extLst>
       <p:ext uri="{BB962C8B-B14F-4D97-AF65-F5344CB8AC3E}">
@@ -8909,8 +8922,8 @@
         </p:nvSpPr>
         <p:spPr>
           <a:xfrm>
-            <a:off x="677334" y="1248229"/>
-            <a:ext cx="8596668" cy="5743121"/>
+            <a:off x="677334" y="1596571"/>
+            <a:ext cx="8829524" cy="5261429"/>
           </a:xfrm>
         </p:spPr>
         <p:txBody>
@@ -8924,131 +8937,216 @@
             </a:pPr>
             <a:r>
               <a:rPr lang="en-US" dirty="0" smtClean="0"/>
-              <a:t>Some options we can consider those are :</a:t>
-            </a:r>
-          </a:p>
-          <a:p>
-            <a:pPr>
-              <a:buFont typeface="Wingdings" panose="05000000000000000000" pitchFamily="2" charset="2"/>
-              <a:buChar char="ü"/>
-            </a:pPr>
-            <a:r>
-              <a:rPr lang="en-US" b="1" dirty="0" smtClean="0"/>
-              <a:t>Prometheus</a:t>
-            </a:r>
-          </a:p>
-          <a:p>
-            <a:pPr>
-              <a:buFont typeface="Wingdings" panose="05000000000000000000" pitchFamily="2" charset="2"/>
-              <a:buChar char="ü"/>
-            </a:pPr>
-            <a:r>
-              <a:rPr lang="en-US" b="1" dirty="0" smtClean="0"/>
-              <a:t>Gray Log</a:t>
-            </a:r>
-          </a:p>
-          <a:p>
-            <a:pPr marL="0" indent="0">
-              <a:buNone/>
-            </a:pPr>
-            <a:r>
-              <a:rPr lang="en-US" dirty="0" smtClean="0"/>
-              <a:t>Easy to integrated Syslog and cross application events and easily we can gain insights of cross service events </a:t>
-            </a:r>
-          </a:p>
-          <a:p>
-            <a:pPr>
-              <a:buFont typeface="Wingdings" panose="05000000000000000000" pitchFamily="2" charset="2"/>
-              <a:buChar char="ü"/>
-            </a:pPr>
-            <a:r>
-              <a:rPr lang="en-US" dirty="0" smtClean="0"/>
-              <a:t>Google cloud stack driver or other cloud provider services as manage services</a:t>
-            </a:r>
-          </a:p>
-          <a:p>
-            <a:pPr>
-              <a:buFont typeface="Wingdings" panose="05000000000000000000" pitchFamily="2" charset="2"/>
-              <a:buChar char="ü"/>
-            </a:pPr>
-            <a:r>
-              <a:rPr lang="en-US" dirty="0" smtClean="0"/>
-              <a:t>Use </a:t>
-            </a:r>
-            <a:r>
-              <a:rPr lang="en-US" b="1" dirty="0" err="1" smtClean="0"/>
-              <a:t>JMeter</a:t>
-            </a:r>
-            <a:r>
-              <a:rPr lang="en-US" dirty="0" smtClean="0"/>
-              <a:t> and write K6 script for performance benchmarking </a:t>
-            </a:r>
-          </a:p>
-          <a:p>
-            <a:pPr>
-              <a:buFont typeface="Wingdings" panose="05000000000000000000" pitchFamily="2" charset="2"/>
-              <a:buChar char="ü"/>
-            </a:pPr>
-            <a:r>
-              <a:rPr lang="en-US" dirty="0" smtClean="0"/>
-              <a:t>Use </a:t>
-            </a:r>
-            <a:r>
-              <a:rPr lang="en-US" b="1" dirty="0" err="1" smtClean="0"/>
-              <a:t>JProfiler</a:t>
-            </a:r>
-            <a:r>
-              <a:rPr lang="en-US" dirty="0" smtClean="0"/>
-              <a:t> to instrument our service and run SVT test cases  </a:t>
-            </a:r>
-          </a:p>
-          <a:p>
-            <a:pPr marL="0" indent="0">
-              <a:buNone/>
-            </a:pPr>
-            <a:endParaRPr lang="en-US" dirty="0" smtClean="0"/>
-          </a:p>
-          <a:p>
-            <a:pPr marL="0" indent="0">
-              <a:buNone/>
-            </a:pPr>
-            <a:endParaRPr lang="en-US" dirty="0" smtClean="0"/>
-          </a:p>
-          <a:p>
-            <a:pPr marL="0" indent="0">
-              <a:buNone/>
-            </a:pPr>
-            <a:endParaRPr lang="en-US" dirty="0" smtClean="0"/>
-          </a:p>
-          <a:p>
-            <a:pPr marL="0" indent="0">
-              <a:buNone/>
-            </a:pPr>
-            <a:endParaRPr lang="en-US" dirty="0" smtClean="0"/>
-          </a:p>
-          <a:p>
-            <a:pPr marL="0" indent="0">
-              <a:buNone/>
-            </a:pPr>
-            <a:endParaRPr lang="en-US" dirty="0" smtClean="0"/>
-          </a:p>
-          <a:p>
-            <a:pPr marL="0" indent="0">
-              <a:buNone/>
-            </a:pPr>
-            <a:endParaRPr lang="en-US" dirty="0"/>
-          </a:p>
-          <a:p>
-            <a:pPr marL="0" indent="0">
-              <a:buNone/>
-            </a:pPr>
-            <a:endParaRPr lang="en-US" dirty="0" smtClean="0"/>
+              <a:t>Below are list feature improvement items we can consider to make our application cloud native and can support 12 factors of micros vice application.</a:t>
+            </a:r>
           </a:p>
           <a:p>
             <a:pPr>
               <a:buFont typeface="+mj-lt"/>
               <a:buAutoNum type="arabicPeriod"/>
             </a:pPr>
+            <a:r>
+              <a:rPr lang="en-US" dirty="0" smtClean="0"/>
+              <a:t>Add security aspects and align application security with global standards.- </a:t>
+            </a:r>
+            <a:r>
+              <a:rPr lang="en-US" b="1" u="sng" dirty="0" smtClean="0">
+                <a:effectLst>
+                  <a:outerShdw blurRad="38100" dist="38100" dir="2700000" algn="tl">
+                    <a:srgbClr val="000000">
+                      <a:alpha val="43137"/>
+                    </a:srgbClr>
+                  </a:outerShdw>
+                </a:effectLst>
+              </a:rPr>
+              <a:t>Secure by design </a:t>
+            </a:r>
+          </a:p>
+          <a:p>
+            <a:pPr>
+              <a:buFont typeface="Wingdings" panose="05000000000000000000" pitchFamily="2" charset="2"/>
+              <a:buChar char="§"/>
+            </a:pPr>
+            <a:r>
+              <a:rPr lang="en-US" dirty="0" smtClean="0"/>
+              <a:t>Use and integrated security scan tools with CI/CD integration. Also we can utilize cloud provided security scan tools</a:t>
+            </a:r>
+          </a:p>
+          <a:p>
+            <a:pPr>
+              <a:buFont typeface="Wingdings" panose="05000000000000000000" pitchFamily="2" charset="2"/>
+              <a:buChar char="§"/>
+            </a:pPr>
+            <a:r>
+              <a:rPr lang="en-US" dirty="0"/>
+              <a:t>Support </a:t>
+            </a:r>
+            <a:r>
+              <a:rPr lang="en-US" b="1" dirty="0"/>
+              <a:t>Prod profile </a:t>
+            </a:r>
+            <a:r>
+              <a:rPr lang="en-US" dirty="0"/>
+              <a:t>setting in application using standard practices </a:t>
+            </a:r>
+          </a:p>
+          <a:p>
+            <a:pPr marL="0" indent="0">
+              <a:buNone/>
+            </a:pPr>
+            <a:r>
+              <a:rPr lang="en-US" dirty="0">
+                <a:hlinkClick r:id="rId2"/>
+              </a:rPr>
+              <a:t>https://tomgregory.com/how-to-measure-code-coverage-using-sonarqube-and-jacoco</a:t>
+            </a:r>
+            <a:r>
+              <a:rPr lang="en-US" dirty="0" smtClean="0">
+                <a:hlinkClick r:id="rId2"/>
+              </a:rPr>
+              <a:t>/</a:t>
+            </a:r>
+            <a:r>
+              <a:rPr lang="en-US" dirty="0" smtClean="0"/>
+              <a:t> </a:t>
+            </a:r>
+          </a:p>
+          <a:p>
+            <a:pPr marL="0" indent="0">
+              <a:buNone/>
+            </a:pPr>
+            <a:r>
+              <a:rPr lang="en-US" dirty="0">
+                <a:hlinkClick r:id="rId3"/>
+              </a:rPr>
+              <a:t>https://</a:t>
+            </a:r>
+            <a:r>
+              <a:rPr lang="en-US" dirty="0" smtClean="0">
+                <a:hlinkClick r:id="rId3"/>
+              </a:rPr>
+              <a:t>cloud.google.com/security/infrastructure</a:t>
+            </a:r>
+            <a:r>
+              <a:rPr lang="en-US" dirty="0" smtClean="0"/>
+              <a:t> </a:t>
+            </a:r>
+          </a:p>
+          <a:p>
+            <a:r>
+              <a:rPr lang="en-US" dirty="0" smtClean="0"/>
+              <a:t>Use </a:t>
+            </a:r>
+            <a:r>
+              <a:rPr lang="en-US" dirty="0"/>
+              <a:t>JWT or authentication service as per requirement and enforce authorization in service, develop or encryption service to securely transfer data.</a:t>
+            </a:r>
+          </a:p>
+          <a:p>
+            <a:pPr marL="0" indent="0">
+              <a:buNone/>
+            </a:pPr>
+            <a:r>
+              <a:rPr lang="en-US" dirty="0" smtClean="0"/>
+              <a:t>2. </a:t>
+            </a:r>
+            <a:r>
+              <a:rPr lang="en-US" b="1" dirty="0" smtClean="0"/>
+              <a:t>Integrate service to APM</a:t>
+            </a:r>
+            <a:r>
+              <a:rPr lang="en-US" dirty="0" smtClean="0"/>
+              <a:t> (application performance and monitoring </a:t>
+            </a:r>
+            <a:r>
+              <a:rPr lang="en-US" dirty="0"/>
+              <a:t>) and </a:t>
+            </a:r>
+            <a:r>
+              <a:rPr lang="en-US" b="1" dirty="0">
+                <a:effectLst>
+                  <a:outerShdw blurRad="38100" dist="38100" dir="2700000" algn="tl">
+                    <a:srgbClr val="000000">
+                      <a:alpha val="43137"/>
+                    </a:srgbClr>
+                  </a:outerShdw>
+                </a:effectLst>
+              </a:rPr>
+              <a:t>Monitor, troubleshoot, and improve application </a:t>
+            </a:r>
+            <a:r>
+              <a:rPr lang="en-US" b="1" dirty="0" smtClean="0">
+                <a:effectLst>
+                  <a:outerShdw blurRad="38100" dist="38100" dir="2700000" algn="tl">
+                    <a:srgbClr val="000000">
+                      <a:alpha val="43137"/>
+                    </a:srgbClr>
+                  </a:outerShdw>
+                </a:effectLst>
+              </a:rPr>
+              <a:t>performance</a:t>
+            </a:r>
+            <a:r>
+              <a:rPr lang="en-US" dirty="0" smtClean="0"/>
+              <a:t>.</a:t>
+            </a:r>
+          </a:p>
+          <a:p>
+            <a:pPr marL="0" indent="0">
+              <a:buNone/>
+            </a:pPr>
+            <a:r>
+              <a:rPr lang="en-US" dirty="0" smtClean="0"/>
+              <a:t>Couple of option we can select depends on our requirement (manage/in house )</a:t>
+            </a:r>
+          </a:p>
+          <a:p>
+            <a:pPr marL="0" indent="0">
+              <a:buNone/>
+            </a:pPr>
+            <a:endParaRPr lang="en-US" dirty="0" smtClean="0"/>
+          </a:p>
+          <a:p>
+            <a:pPr marL="0" indent="0">
+              <a:buNone/>
+            </a:pPr>
+            <a:endParaRPr lang="en-US" dirty="0" smtClean="0"/>
+          </a:p>
+          <a:p>
+            <a:pPr marL="0" indent="0">
+              <a:buNone/>
+            </a:pPr>
+            <a:endParaRPr lang="en-US" dirty="0" smtClean="0"/>
+          </a:p>
+          <a:p>
+            <a:pPr marL="0" indent="0">
+              <a:buNone/>
+            </a:pPr>
+            <a:endParaRPr lang="en-US" dirty="0" smtClean="0"/>
+          </a:p>
+          <a:p>
+            <a:pPr marL="0" indent="0">
+              <a:buNone/>
+            </a:pPr>
+            <a:endParaRPr lang="en-US" dirty="0" smtClean="0"/>
+          </a:p>
+          <a:p>
+            <a:pPr marL="0" indent="0">
+              <a:buNone/>
+            </a:pPr>
+            <a:endParaRPr lang="en-US" dirty="0"/>
+          </a:p>
+          <a:p>
+            <a:pPr marL="0" indent="0">
+              <a:buNone/>
+            </a:pPr>
+            <a:endParaRPr lang="en-US" dirty="0" smtClean="0"/>
+          </a:p>
+          <a:p>
+            <a:pPr>
+              <a:buFont typeface="+mj-lt"/>
+              <a:buAutoNum type="arabicPeriod"/>
+            </a:pPr>
             <a:endParaRPr lang="en-US" dirty="0" smtClean="0"/>
           </a:p>
           <a:p>
@@ -9062,7 +9160,7 @@
     </p:spTree>
     <p:extLst>
       <p:ext uri="{BB962C8B-B14F-4D97-AF65-F5344CB8AC3E}">
-        <p14:creationId xmlns:p14="http://schemas.microsoft.com/office/powerpoint/2010/main" val="118096267"/>
+        <p14:creationId xmlns:p14="http://schemas.microsoft.com/office/powerpoint/2010/main" val="1050529957"/>
       </p:ext>
     </p:extLst>
   </p:cSld>
@@ -9113,6 +9211,235 @@
           <a:p>
             <a:r>
               <a:rPr lang="en-US" dirty="0"/>
+              <a:t>Future enhancements </a:t>
+            </a:r>
+            <a:br>
+              <a:rPr lang="en-US" dirty="0"/>
+            </a:br>
+            <a:r>
+              <a:rPr lang="en-US" dirty="0" smtClean="0"/>
+              <a:t> </a:t>
+            </a:r>
+            <a:endParaRPr lang="en-US" dirty="0"/>
+          </a:p>
+        </p:txBody>
+      </p:sp>
+      <p:sp>
+        <p:nvSpPr>
+          <p:cNvPr id="4" name="Content Placeholder 3"/>
+          <p:cNvSpPr>
+            <a:spLocks noGrp="1"/>
+          </p:cNvSpPr>
+          <p:nvPr>
+            <p:ph idx="1"/>
+          </p:nvPr>
+        </p:nvSpPr>
+        <p:spPr>
+          <a:xfrm>
+            <a:off x="677334" y="1248229"/>
+            <a:ext cx="8596668" cy="5743121"/>
+          </a:xfrm>
+        </p:spPr>
+        <p:txBody>
+          <a:bodyPr>
+            <a:normAutofit/>
+          </a:bodyPr>
+          <a:lstStyle/>
+          <a:p>
+            <a:pPr marL="0" indent="0">
+              <a:buNone/>
+            </a:pPr>
+            <a:r>
+              <a:rPr lang="en-US" dirty="0" smtClean="0"/>
+              <a:t>Some options we can consider those are :</a:t>
+            </a:r>
+          </a:p>
+          <a:p>
+            <a:pPr>
+              <a:buFont typeface="Wingdings" panose="05000000000000000000" pitchFamily="2" charset="2"/>
+              <a:buChar char="ü"/>
+            </a:pPr>
+            <a:r>
+              <a:rPr lang="en-US" b="1" dirty="0" smtClean="0"/>
+              <a:t>Prometheus</a:t>
+            </a:r>
+          </a:p>
+          <a:p>
+            <a:pPr>
+              <a:buFont typeface="Wingdings" panose="05000000000000000000" pitchFamily="2" charset="2"/>
+              <a:buChar char="ü"/>
+            </a:pPr>
+            <a:r>
+              <a:rPr lang="en-US" b="1" dirty="0" smtClean="0"/>
+              <a:t>Gray Log</a:t>
+            </a:r>
+          </a:p>
+          <a:p>
+            <a:pPr marL="0" indent="0">
+              <a:buNone/>
+            </a:pPr>
+            <a:r>
+              <a:rPr lang="en-US" dirty="0" smtClean="0"/>
+              <a:t>Easy to integrated Syslog and cross application events and easily we can gain insights of cross service events </a:t>
+            </a:r>
+          </a:p>
+          <a:p>
+            <a:pPr>
+              <a:buFont typeface="Wingdings" panose="05000000000000000000" pitchFamily="2" charset="2"/>
+              <a:buChar char="ü"/>
+            </a:pPr>
+            <a:r>
+              <a:rPr lang="en-US" dirty="0" smtClean="0"/>
+              <a:t>Google cloud stack driver or other cloud provider services as manage services</a:t>
+            </a:r>
+          </a:p>
+          <a:p>
+            <a:pPr>
+              <a:buFont typeface="Wingdings" panose="05000000000000000000" pitchFamily="2" charset="2"/>
+              <a:buChar char="ü"/>
+            </a:pPr>
+            <a:r>
+              <a:rPr lang="en-US" dirty="0" smtClean="0"/>
+              <a:t>Use </a:t>
+            </a:r>
+            <a:r>
+              <a:rPr lang="en-US" b="1" dirty="0" err="1" smtClean="0"/>
+              <a:t>JMeter</a:t>
+            </a:r>
+            <a:r>
+              <a:rPr lang="en-US" dirty="0" smtClean="0"/>
+              <a:t> and write K6 script for performance benchmarking </a:t>
+            </a:r>
+          </a:p>
+          <a:p>
+            <a:pPr>
+              <a:buFont typeface="Wingdings" panose="05000000000000000000" pitchFamily="2" charset="2"/>
+              <a:buChar char="ü"/>
+            </a:pPr>
+            <a:r>
+              <a:rPr lang="en-US" dirty="0" smtClean="0"/>
+              <a:t>Use </a:t>
+            </a:r>
+            <a:r>
+              <a:rPr lang="en-US" b="1" dirty="0" err="1" smtClean="0"/>
+              <a:t>JProfiler</a:t>
+            </a:r>
+            <a:r>
+              <a:rPr lang="en-US" dirty="0" smtClean="0"/>
+              <a:t> to instrument our service and run SVT test cases  </a:t>
+            </a:r>
+          </a:p>
+          <a:p>
+            <a:pPr marL="0" indent="0">
+              <a:buNone/>
+            </a:pPr>
+            <a:endParaRPr lang="en-US" dirty="0" smtClean="0"/>
+          </a:p>
+          <a:p>
+            <a:pPr marL="0" indent="0">
+              <a:buNone/>
+            </a:pPr>
+            <a:endParaRPr lang="en-US" dirty="0" smtClean="0"/>
+          </a:p>
+          <a:p>
+            <a:pPr marL="0" indent="0">
+              <a:buNone/>
+            </a:pPr>
+            <a:endParaRPr lang="en-US" dirty="0" smtClean="0"/>
+          </a:p>
+          <a:p>
+            <a:pPr marL="0" indent="0">
+              <a:buNone/>
+            </a:pPr>
+            <a:endParaRPr lang="en-US" dirty="0" smtClean="0"/>
+          </a:p>
+          <a:p>
+            <a:pPr marL="0" indent="0">
+              <a:buNone/>
+            </a:pPr>
+            <a:endParaRPr lang="en-US" dirty="0" smtClean="0"/>
+          </a:p>
+          <a:p>
+            <a:pPr marL="0" indent="0">
+              <a:buNone/>
+            </a:pPr>
+            <a:endParaRPr lang="en-US" dirty="0"/>
+          </a:p>
+          <a:p>
+            <a:pPr marL="0" indent="0">
+              <a:buNone/>
+            </a:pPr>
+            <a:endParaRPr lang="en-US" dirty="0" smtClean="0"/>
+          </a:p>
+          <a:p>
+            <a:pPr>
+              <a:buFont typeface="+mj-lt"/>
+              <a:buAutoNum type="arabicPeriod"/>
+            </a:pPr>
+            <a:endParaRPr lang="en-US" dirty="0" smtClean="0"/>
+          </a:p>
+          <a:p>
+            <a:pPr marL="0" indent="0" fontAlgn="t">
+              <a:buNone/>
+            </a:pPr>
+            <a:endParaRPr lang="en-US" b="1" i="1" u="sng" dirty="0" smtClean="0"/>
+          </a:p>
+        </p:txBody>
+      </p:sp>
+    </p:spTree>
+    <p:extLst>
+      <p:ext uri="{BB962C8B-B14F-4D97-AF65-F5344CB8AC3E}">
+        <p14:creationId xmlns:p14="http://schemas.microsoft.com/office/powerpoint/2010/main" val="118096267"/>
+      </p:ext>
+    </p:extLst>
+  </p:cSld>
+  <p:clrMapOvr>
+    <a:masterClrMapping/>
+  </p:clrMapOvr>
+  <p:timing>
+    <p:tnLst>
+      <p:par>
+        <p:cTn id="1" dur="indefinite" restart="never" nodeType="tmRoot"/>
+      </p:par>
+    </p:tnLst>
+  </p:timing>
+</p:sld>
+</file>
+
+<file path=ppt/slides/slide22.xml><?xml version="1.0" encoding="utf-8"?>
+<p:sld xmlns:a="http://schemas.openxmlformats.org/drawingml/2006/main" xmlns:r="http://schemas.openxmlformats.org/officeDocument/2006/relationships" xmlns:p="http://schemas.openxmlformats.org/presentationml/2006/main">
+  <p:cSld>
+    <p:spTree>
+      <p:nvGrpSpPr>
+        <p:cNvPr id="1" name=""/>
+        <p:cNvGrpSpPr/>
+        <p:nvPr/>
+      </p:nvGrpSpPr>
+      <p:grpSpPr>
+        <a:xfrm>
+          <a:off x="0" y="0"/>
+          <a:ext cx="0" cy="0"/>
+          <a:chOff x="0" y="0"/>
+          <a:chExt cx="0" cy="0"/>
+        </a:xfrm>
+      </p:grpSpPr>
+      <p:sp>
+        <p:nvSpPr>
+          <p:cNvPr id="2" name="Title 1"/>
+          <p:cNvSpPr>
+            <a:spLocks noGrp="1"/>
+          </p:cNvSpPr>
+          <p:nvPr>
+            <p:ph type="title"/>
+          </p:nvPr>
+        </p:nvSpPr>
+        <p:spPr/>
+        <p:txBody>
+          <a:bodyPr/>
+          <a:lstStyle/>
+          <a:p>
+            <a:r>
+              <a:rPr lang="en-US" dirty="0"/>
               <a:t>Future </a:t>
             </a:r>
             <a:r>
@@ -9370,7 +9697,7 @@
 </p:sld>
 </file>
 
-<file path=ppt/slides/slide22.xml><?xml version="1.0" encoding="utf-8"?>
+<file path=ppt/slides/slide23.xml><?xml version="1.0" encoding="utf-8"?>
 <p:sld xmlns:a="http://schemas.openxmlformats.org/drawingml/2006/main" xmlns:r="http://schemas.openxmlformats.org/officeDocument/2006/relationships" xmlns:p="http://schemas.openxmlformats.org/presentationml/2006/main">
   <p:cSld>
     <p:spTree>
@@ -9553,7 +9880,7 @@
 </p:sld>
 </file>
 
-<file path=ppt/slides/slide23.xml><?xml version="1.0" encoding="utf-8"?>
+<file path=ppt/slides/slide24.xml><?xml version="1.0" encoding="utf-8"?>
 <p:sld xmlns:a="http://schemas.openxmlformats.org/drawingml/2006/main" xmlns:r="http://schemas.openxmlformats.org/officeDocument/2006/relationships" xmlns:p="http://schemas.openxmlformats.org/presentationml/2006/main">
   <p:cSld>
     <p:spTree>
@@ -9756,7 +10083,7 @@
 </p:sld>
 </file>
 
-<file path=ppt/slides/slide24.xml><?xml version="1.0" encoding="utf-8"?>
+<file path=ppt/slides/slide25.xml><?xml version="1.0" encoding="utf-8"?>
 <p:sld xmlns:a="http://schemas.openxmlformats.org/drawingml/2006/main" xmlns:r="http://schemas.openxmlformats.org/officeDocument/2006/relationships" xmlns:p="http://schemas.openxmlformats.org/presentationml/2006/main">
   <p:cSld>
     <p:spTree>
@@ -9956,6 +10283,301 @@
 </file>
 
 <file path=ppt/slides/slide3.xml><?xml version="1.0" encoding="utf-8"?>
+<p:sld xmlns:a="http://schemas.openxmlformats.org/drawingml/2006/main" xmlns:r="http://schemas.openxmlformats.org/officeDocument/2006/relationships" xmlns:p="http://schemas.openxmlformats.org/presentationml/2006/main">
+  <p:cSld>
+    <p:spTree>
+      <p:nvGrpSpPr>
+        <p:cNvPr id="1" name=""/>
+        <p:cNvGrpSpPr/>
+        <p:nvPr/>
+      </p:nvGrpSpPr>
+      <p:grpSpPr>
+        <a:xfrm>
+          <a:off x="0" y="0"/>
+          <a:ext cx="0" cy="0"/>
+          <a:chOff x="0" y="0"/>
+          <a:chExt cx="0" cy="0"/>
+        </a:xfrm>
+      </p:grpSpPr>
+      <p:sp>
+        <p:nvSpPr>
+          <p:cNvPr id="2" name="Title 1"/>
+          <p:cNvSpPr>
+            <a:spLocks noGrp="1"/>
+          </p:cNvSpPr>
+          <p:nvPr>
+            <p:ph type="title"/>
+          </p:nvPr>
+        </p:nvSpPr>
+        <p:spPr/>
+        <p:txBody>
+          <a:bodyPr/>
+          <a:lstStyle/>
+          <a:p>
+            <a:r>
+              <a:rPr lang="en-US" dirty="0" smtClean="0"/>
+              <a:t>About </a:t>
+            </a:r>
+            <a:endParaRPr lang="en-US" dirty="0"/>
+          </a:p>
+        </p:txBody>
+      </p:sp>
+      <p:sp>
+        <p:nvSpPr>
+          <p:cNvPr id="3" name="Content Placeholder 2"/>
+          <p:cNvSpPr>
+            <a:spLocks noGrp="1"/>
+          </p:cNvSpPr>
+          <p:nvPr>
+            <p:ph idx="1"/>
+          </p:nvPr>
+        </p:nvSpPr>
+        <p:spPr>
+          <a:xfrm>
+            <a:off x="626220" y="1270000"/>
+            <a:ext cx="8698895" cy="2968170"/>
+          </a:xfrm>
+        </p:spPr>
+        <p:txBody>
+          <a:bodyPr>
+            <a:normAutofit fontScale="77500" lnSpcReduction="20000"/>
+          </a:bodyPr>
+          <a:lstStyle/>
+          <a:p>
+            <a:pPr marL="0" indent="0">
+              <a:buNone/>
+            </a:pPr>
+            <a:r>
+              <a:rPr lang="en-US" dirty="0" smtClean="0"/>
+              <a:t>This document can provide some </a:t>
+            </a:r>
+            <a:r>
+              <a:rPr lang="en-US" dirty="0"/>
+              <a:t>implementation </a:t>
+            </a:r>
+            <a:r>
+              <a:rPr lang="en-US" dirty="0" smtClean="0"/>
+              <a:t>details of </a:t>
+            </a:r>
+            <a:r>
+              <a:rPr lang="en-US" b="1" dirty="0" smtClean="0"/>
+              <a:t>Account Manage </a:t>
+            </a:r>
+            <a:r>
+              <a:rPr lang="en-US" dirty="0" smtClean="0"/>
+              <a:t>with</a:t>
+            </a:r>
+            <a:r>
+              <a:rPr lang="en-US" b="1" dirty="0" smtClean="0"/>
+              <a:t> </a:t>
+            </a:r>
+            <a:r>
+              <a:rPr lang="en-US" dirty="0" smtClean="0"/>
+              <a:t>some below points:</a:t>
+            </a:r>
+          </a:p>
+          <a:p>
+            <a:r>
+              <a:rPr lang="en-US" b="1" u="sng" dirty="0" smtClean="0">
+                <a:effectLst>
+                  <a:outerShdw blurRad="38100" dist="38100" dir="2700000" algn="tl">
+                    <a:srgbClr val="000000">
+                      <a:alpha val="43137"/>
+                    </a:srgbClr>
+                  </a:outerShdw>
+                </a:effectLst>
+              </a:rPr>
+              <a:t>Technical details</a:t>
+            </a:r>
+          </a:p>
+          <a:p>
+            <a:r>
+              <a:rPr lang="en-US" b="1" u="sng" dirty="0" smtClean="0">
+                <a:effectLst>
+                  <a:outerShdw blurRad="38100" dist="38100" dir="2700000" algn="tl">
+                    <a:srgbClr val="000000">
+                      <a:alpha val="43137"/>
+                    </a:srgbClr>
+                  </a:outerShdw>
+                </a:effectLst>
+              </a:rPr>
+              <a:t>Requirements </a:t>
+            </a:r>
+          </a:p>
+          <a:p>
+            <a:r>
+              <a:rPr lang="en-US" b="1" u="sng" dirty="0" smtClean="0">
+                <a:effectLst>
+                  <a:outerShdw blurRad="38100" dist="38100" dir="2700000" algn="tl">
+                    <a:srgbClr val="000000">
+                      <a:alpha val="43137"/>
+                    </a:srgbClr>
+                  </a:outerShdw>
+                </a:effectLst>
+              </a:rPr>
+              <a:t>Service implantation details</a:t>
+            </a:r>
+          </a:p>
+          <a:p>
+            <a:pPr lvl="1"/>
+            <a:r>
+              <a:rPr lang="en-US" b="1" u="sng" dirty="0" smtClean="0">
+                <a:effectLst>
+                  <a:outerShdw blurRad="38100" dist="38100" dir="2700000" algn="tl">
+                    <a:srgbClr val="000000">
+                      <a:alpha val="43137"/>
+                    </a:srgbClr>
+                  </a:outerShdw>
+                </a:effectLst>
+              </a:rPr>
+              <a:t>Rest API documentation </a:t>
+            </a:r>
+          </a:p>
+          <a:p>
+            <a:pPr lvl="1"/>
+            <a:r>
+              <a:rPr lang="en-US" b="1" u="sng" dirty="0" smtClean="0">
+                <a:effectLst>
+                  <a:outerShdw blurRad="38100" dist="38100" dir="2700000" algn="tl">
+                    <a:srgbClr val="000000">
+                      <a:alpha val="43137"/>
+                    </a:srgbClr>
+                  </a:outerShdw>
+                </a:effectLst>
+              </a:rPr>
+              <a:t>Dev Build, Release, Run</a:t>
+            </a:r>
+          </a:p>
+          <a:p>
+            <a:pPr lvl="1"/>
+            <a:r>
+              <a:rPr lang="en-US" b="1" u="sng" dirty="0" smtClean="0">
+                <a:effectLst>
+                  <a:outerShdw blurRad="38100" dist="38100" dir="2700000" algn="tl">
+                    <a:srgbClr val="000000">
+                      <a:alpha val="43137"/>
+                    </a:srgbClr>
+                  </a:outerShdw>
+                </a:effectLst>
+              </a:rPr>
+              <a:t>Dev Integration and cross cutting  services  </a:t>
+            </a:r>
+          </a:p>
+          <a:p>
+            <a:pPr lvl="1"/>
+            <a:r>
+              <a:rPr lang="en-US" b="1" u="sng" dirty="0" smtClean="0">
+                <a:effectLst>
+                  <a:outerShdw blurRad="38100" dist="38100" dir="2700000" algn="tl">
+                    <a:srgbClr val="000000">
+                      <a:alpha val="43137"/>
+                    </a:srgbClr>
+                  </a:outerShdw>
+                </a:effectLst>
+              </a:rPr>
+              <a:t>Development practice and reports</a:t>
+            </a:r>
+          </a:p>
+          <a:p>
+            <a:r>
+              <a:rPr lang="en-US" b="1" u="sng" dirty="0" smtClean="0">
+                <a:effectLst>
+                  <a:outerShdw blurRad="38100" dist="38100" dir="2700000" algn="tl">
+                    <a:srgbClr val="000000">
+                      <a:alpha val="43137"/>
+                    </a:srgbClr>
+                  </a:outerShdw>
+                </a:effectLst>
+              </a:rPr>
+              <a:t>Futures enhancements </a:t>
+            </a:r>
+          </a:p>
+          <a:p>
+            <a:pPr marL="0" indent="0">
+              <a:buNone/>
+            </a:pPr>
+            <a:r>
+              <a:rPr lang="en-US" dirty="0" smtClean="0"/>
+              <a:t> </a:t>
+            </a:r>
+            <a:endParaRPr lang="en-US" dirty="0"/>
+          </a:p>
+        </p:txBody>
+      </p:sp>
+      <p:pic>
+        <p:nvPicPr>
+          <p:cNvPr id="4" name="Picture 3"/>
+          <p:cNvPicPr>
+            <a:picLocks noChangeAspect="1"/>
+          </p:cNvPicPr>
+          <p:nvPr/>
+        </p:nvPicPr>
+        <p:blipFill rotWithShape="1">
+          <a:blip r:embed="rId2">
+            <a:extLst>
+              <a:ext uri="{BEBA8EAE-BF5A-486C-A8C5-ECC9F3942E4B}">
+                <a14:imgProps xmlns:a14="http://schemas.microsoft.com/office/drawing/2010/main">
+                  <a14:imgLayer r:embed="rId3">
+                    <a14:imgEffect>
+                      <a14:brightnessContrast bright="-20000" contrast="40000"/>
+                    </a14:imgEffect>
+                  </a14:imgLayer>
+                </a14:imgProps>
+              </a:ext>
+            </a:extLst>
+          </a:blip>
+          <a:srcRect r="2650" b="40662"/>
+          <a:stretch/>
+        </p:blipFill>
+        <p:spPr>
+          <a:xfrm>
+            <a:off x="851505" y="4383314"/>
+            <a:ext cx="8829523" cy="2373086"/>
+          </a:xfrm>
+          <a:prstGeom prst="roundRect">
+            <a:avLst>
+              <a:gd name="adj" fmla="val 8594"/>
+            </a:avLst>
+          </a:prstGeom>
+          <a:solidFill>
+            <a:srgbClr val="FFFFFF">
+              <a:shade val="85000"/>
+            </a:srgbClr>
+          </a:solidFill>
+          <a:ln>
+            <a:noFill/>
+          </a:ln>
+          <a:effectLst>
+            <a:outerShdw blurRad="50800" dist="38100" dir="5400000" algn="t" rotWithShape="0">
+              <a:prstClr val="black">
+                <a:alpha val="40000"/>
+              </a:prstClr>
+            </a:outerShdw>
+            <a:reflection blurRad="6350" stA="50000" endA="295" endPos="92000" dist="101600" dir="5400000" sy="-100000" algn="bl" rotWithShape="0"/>
+          </a:effectLst>
+        </p:spPr>
+      </p:pic>
+    </p:spTree>
+    <p:extLst>
+      <p:ext uri="{BB962C8B-B14F-4D97-AF65-F5344CB8AC3E}">
+        <p14:creationId xmlns:p14="http://schemas.microsoft.com/office/powerpoint/2010/main" val="943976934"/>
+      </p:ext>
+    </p:extLst>
+  </p:cSld>
+  <p:clrMapOvr>
+    <a:masterClrMapping/>
+  </p:clrMapOvr>
+  <p:timing>
+    <p:tnLst>
+      <p:par>
+        <p:cTn id="1" dur="indefinite" restart="never" nodeType="tmRoot"/>
+      </p:par>
+    </p:tnLst>
+  </p:timing>
+</p:sld>
+</file>
+
+<file path=ppt/slides/slide4.xml><?xml version="1.0" encoding="utf-8"?>
 <p:sld xmlns:a="http://schemas.openxmlformats.org/drawingml/2006/main" xmlns:r="http://schemas.openxmlformats.org/officeDocument/2006/relationships" xmlns:p="http://schemas.openxmlformats.org/presentationml/2006/main">
   <p:cSld>
     <p:spTree>
@@ -10834,238 +11456,6 @@
 </p:sld>
 </file>
 
-<file path=ppt/slides/slide4.xml><?xml version="1.0" encoding="utf-8"?>
-<p:sld xmlns:a="http://schemas.openxmlformats.org/drawingml/2006/main" xmlns:r="http://schemas.openxmlformats.org/officeDocument/2006/relationships" xmlns:p="http://schemas.openxmlformats.org/presentationml/2006/main">
-  <p:cSld>
-    <p:spTree>
-      <p:nvGrpSpPr>
-        <p:cNvPr id="1" name=""/>
-        <p:cNvGrpSpPr/>
-        <p:nvPr/>
-      </p:nvGrpSpPr>
-      <p:grpSpPr>
-        <a:xfrm>
-          <a:off x="0" y="0"/>
-          <a:ext cx="0" cy="0"/>
-          <a:chOff x="0" y="0"/>
-          <a:chExt cx="0" cy="0"/>
-        </a:xfrm>
-      </p:grpSpPr>
-      <p:sp>
-        <p:nvSpPr>
-          <p:cNvPr id="2" name="Title 1"/>
-          <p:cNvSpPr>
-            <a:spLocks noGrp="1"/>
-          </p:cNvSpPr>
-          <p:nvPr>
-            <p:ph type="title"/>
-          </p:nvPr>
-        </p:nvSpPr>
-        <p:spPr/>
-        <p:txBody>
-          <a:bodyPr/>
-          <a:lstStyle/>
-          <a:p>
-            <a:r>
-              <a:rPr lang="en-US" dirty="0" smtClean="0"/>
-              <a:t>Requirements </a:t>
-            </a:r>
-            <a:endParaRPr lang="en-US" dirty="0"/>
-          </a:p>
-        </p:txBody>
-      </p:sp>
-      <p:sp>
-        <p:nvSpPr>
-          <p:cNvPr id="3" name="Content Placeholder 2"/>
-          <p:cNvSpPr>
-            <a:spLocks noGrp="1"/>
-          </p:cNvSpPr>
-          <p:nvPr>
-            <p:ph idx="1"/>
-          </p:nvPr>
-        </p:nvSpPr>
-        <p:spPr>
-          <a:xfrm>
-            <a:off x="429684" y="1381125"/>
-            <a:ext cx="8596668" cy="4791075"/>
-          </a:xfrm>
-        </p:spPr>
-        <p:txBody>
-          <a:bodyPr>
-            <a:noAutofit/>
-          </a:bodyPr>
-          <a:lstStyle/>
-          <a:p>
-            <a:r>
-              <a:rPr lang="en-US" sz="1300" dirty="0" smtClean="0"/>
-              <a:t>Find some details of feature cover in this scope of POC</a:t>
-            </a:r>
-          </a:p>
-          <a:p>
-            <a:pPr marL="0" indent="0">
-              <a:buNone/>
-            </a:pPr>
-            <a:r>
-              <a:rPr lang="en-US" sz="1300" b="1" u="sng" dirty="0" smtClean="0"/>
-              <a:t>Business goal : </a:t>
-            </a:r>
-          </a:p>
-          <a:p>
-            <a:pPr marL="0" indent="0">
-              <a:buNone/>
-            </a:pPr>
-            <a:r>
-              <a:rPr lang="en-US" sz="1300" dirty="0" smtClean="0"/>
-              <a:t>Create service which can support to transfer amount from one account to other</a:t>
-            </a:r>
-          </a:p>
-          <a:p>
-            <a:pPr marL="0" indent="0">
-              <a:buNone/>
-            </a:pPr>
-            <a:r>
-              <a:rPr lang="en-US" sz="1300" b="1" dirty="0" smtClean="0"/>
-              <a:t>Assumptions</a:t>
-            </a:r>
-            <a:r>
-              <a:rPr lang="en-US" sz="1300" dirty="0" smtClean="0"/>
-              <a:t> :</a:t>
-            </a:r>
-          </a:p>
-          <a:p>
-            <a:pPr marL="0" indent="0">
-              <a:buNone/>
-            </a:pPr>
-            <a:r>
-              <a:rPr lang="en-US" sz="1300" dirty="0" smtClean="0"/>
-              <a:t>System not covering security and authorization concerns in current scope of implementation.</a:t>
-            </a:r>
-          </a:p>
-          <a:p>
-            <a:pPr marL="0" indent="0">
-              <a:buNone/>
-            </a:pPr>
-            <a:r>
-              <a:rPr lang="en-US" sz="1300" dirty="0" smtClean="0"/>
-              <a:t>Persistent state can be managed in in memory, notification service integration not in current scope  </a:t>
-            </a:r>
-          </a:p>
-          <a:p>
-            <a:pPr marL="0" indent="0">
-              <a:buNone/>
-            </a:pPr>
-            <a:r>
-              <a:rPr lang="en-US" sz="1300" b="1" u="sng" dirty="0" smtClean="0"/>
-              <a:t>Functional aspects :</a:t>
-            </a:r>
-          </a:p>
-          <a:p>
-            <a:pPr marL="0" indent="0">
-              <a:buNone/>
-            </a:pPr>
-            <a:r>
-              <a:rPr lang="en-US" sz="1300" dirty="0" smtClean="0"/>
-              <a:t>1 System should validated for transaction details (account and amount ) before transfer amount from one account to other account.</a:t>
-            </a:r>
-          </a:p>
-          <a:p>
-            <a:pPr marL="0" indent="0">
-              <a:buNone/>
-            </a:pPr>
-            <a:r>
-              <a:rPr lang="en-US" sz="1300" dirty="0"/>
-              <a:t>2</a:t>
-            </a:r>
-            <a:r>
-              <a:rPr lang="en-US" sz="1300" dirty="0" smtClean="0"/>
-              <a:t> System should provide some APIS to manager user account operation –GET/POST/DELETE </a:t>
-            </a:r>
-          </a:p>
-          <a:p>
-            <a:pPr marL="0" indent="0">
-              <a:buNone/>
-            </a:pPr>
-            <a:r>
-              <a:rPr lang="en-US" sz="1300" dirty="0"/>
-              <a:t>3</a:t>
-            </a:r>
-            <a:r>
-              <a:rPr lang="en-US" sz="1300" dirty="0" smtClean="0"/>
-              <a:t> System should support high concurrency and fault tolerant money transfer operation.</a:t>
-            </a:r>
-          </a:p>
-          <a:p>
-            <a:pPr marL="0" indent="0">
-              <a:buNone/>
-            </a:pPr>
-            <a:r>
-              <a:rPr lang="en-US" sz="1300" u="sng" dirty="0" smtClean="0"/>
-              <a:t>No Functional aspect :</a:t>
-            </a:r>
-          </a:p>
-          <a:p>
-            <a:pPr marL="0" indent="0">
-              <a:buNone/>
-            </a:pPr>
-            <a:r>
-              <a:rPr lang="en-US" sz="1300" dirty="0" smtClean="0"/>
-              <a:t>1. Application should support for cloud native deployment/management and can easy to scale </a:t>
-            </a:r>
-          </a:p>
-          <a:p>
-            <a:pPr marL="0" indent="0">
-              <a:buNone/>
-            </a:pPr>
-            <a:r>
-              <a:rPr lang="en-US" sz="1300" dirty="0" smtClean="0"/>
-              <a:t>2. Application should support system monitoring features like metrics , health check and so on </a:t>
-            </a:r>
-          </a:p>
-          <a:p>
-            <a:pPr marL="0" indent="0">
-              <a:buNone/>
-            </a:pPr>
-            <a:r>
-              <a:rPr lang="en-US" sz="1300" dirty="0" smtClean="0"/>
-              <a:t>3. Application should support valid exception mechanism   </a:t>
-            </a:r>
-          </a:p>
-          <a:p>
-            <a:pPr marL="0" indent="0">
-              <a:buNone/>
-            </a:pPr>
-            <a:r>
-              <a:rPr lang="en-US" sz="1300" dirty="0"/>
-              <a:t> </a:t>
-            </a:r>
-            <a:r>
-              <a:rPr lang="en-US" sz="1300" dirty="0" smtClean="0"/>
-              <a:t>  </a:t>
-            </a:r>
-            <a:endParaRPr lang="en-US" sz="1300" dirty="0"/>
-          </a:p>
-        </p:txBody>
-      </p:sp>
-    </p:spTree>
-    <p:extLst>
-      <p:ext uri="{BB962C8B-B14F-4D97-AF65-F5344CB8AC3E}">
-        <p14:creationId xmlns:p14="http://schemas.microsoft.com/office/powerpoint/2010/main" val="2923028439"/>
-      </p:ext>
-    </p:extLst>
-  </p:cSld>
-  <p:clrMapOvr>
-    <a:masterClrMapping/>
-  </p:clrMapOvr>
-  <p:timing>
-    <p:tnLst>
-      <p:par>
-        <p:cTn id="1" dur="indefinite" restart="never" nodeType="tmRoot"/>
-      </p:par>
-    </p:tnLst>
-  </p:timing>
-</p:sld>
-</file>
-
 <file path=ppt/slides/slide5.xml><?xml version="1.0" encoding="utf-8"?>
 <p:sld xmlns:a="http://schemas.openxmlformats.org/drawingml/2006/main" xmlns:r="http://schemas.openxmlformats.org/officeDocument/2006/relationships" xmlns:p="http://schemas.openxmlformats.org/presentationml/2006/main">
   <p:cSld>
@@ -11099,21 +11489,189 @@
           <a:lstStyle/>
           <a:p>
             <a:r>
-              <a:rPr lang="en-US" dirty="0"/>
-              <a:t>Service implantation details</a:t>
-            </a:r>
-            <a:r>
               <a:rPr lang="en-US" dirty="0" smtClean="0"/>
-              <a:t>	</a:t>
+              <a:t>Requirements </a:t>
             </a:r>
             <a:endParaRPr lang="en-US" dirty="0"/>
+          </a:p>
+        </p:txBody>
+      </p:sp>
+      <p:sp>
+        <p:nvSpPr>
+          <p:cNvPr id="3" name="Content Placeholder 2"/>
+          <p:cNvSpPr>
+            <a:spLocks noGrp="1"/>
+          </p:cNvSpPr>
+          <p:nvPr>
+            <p:ph idx="1"/>
+          </p:nvPr>
+        </p:nvSpPr>
+        <p:spPr>
+          <a:xfrm>
+            <a:off x="429684" y="1381125"/>
+            <a:ext cx="8596668" cy="4791075"/>
+          </a:xfrm>
+        </p:spPr>
+        <p:txBody>
+          <a:bodyPr>
+            <a:noAutofit/>
+          </a:bodyPr>
+          <a:lstStyle/>
+          <a:p>
+            <a:r>
+              <a:rPr lang="en-US" sz="1300" dirty="0" smtClean="0"/>
+              <a:t>Find some details of feature cover in this scope of POC</a:t>
+            </a:r>
+          </a:p>
+          <a:p>
+            <a:pPr marL="0" indent="0">
+              <a:buNone/>
+            </a:pPr>
+            <a:r>
+              <a:rPr lang="en-US" sz="1300" b="1" u="sng" dirty="0" smtClean="0"/>
+              <a:t>Business goal : </a:t>
+            </a:r>
+          </a:p>
+          <a:p>
+            <a:pPr marL="0" indent="0">
+              <a:buNone/>
+            </a:pPr>
+            <a:r>
+              <a:rPr lang="en-US" sz="1300" dirty="0" smtClean="0"/>
+              <a:t>Create service which can support to transfer amount from one account to other</a:t>
+            </a:r>
+          </a:p>
+          <a:p>
+            <a:pPr marL="0" indent="0">
+              <a:buNone/>
+            </a:pPr>
+            <a:r>
+              <a:rPr lang="en-US" sz="1300" b="1" dirty="0" smtClean="0"/>
+              <a:t>Assumptions</a:t>
+            </a:r>
+            <a:r>
+              <a:rPr lang="en-US" sz="1300" dirty="0" smtClean="0"/>
+              <a:t> :</a:t>
+            </a:r>
+          </a:p>
+          <a:p>
+            <a:pPr marL="0" indent="0">
+              <a:buNone/>
+            </a:pPr>
+            <a:r>
+              <a:rPr lang="en-US" sz="1300" dirty="0" smtClean="0"/>
+              <a:t>System not covering security and authorization concerns in current scope of implementation.</a:t>
+            </a:r>
+          </a:p>
+          <a:p>
+            <a:pPr marL="0" indent="0">
+              <a:buNone/>
+            </a:pPr>
+            <a:r>
+              <a:rPr lang="en-US" sz="1300" dirty="0" smtClean="0"/>
+              <a:t>Persistent state can be managed in in memory, notification service integration not in current scope  </a:t>
+            </a:r>
+          </a:p>
+          <a:p>
+            <a:pPr marL="0" indent="0">
+              <a:buNone/>
+            </a:pPr>
+            <a:r>
+              <a:rPr lang="en-US" sz="1300" b="1" u="sng" dirty="0" smtClean="0"/>
+              <a:t>Functional aspects :</a:t>
+            </a:r>
+          </a:p>
+          <a:p>
+            <a:pPr marL="0" indent="0">
+              <a:buNone/>
+            </a:pPr>
+            <a:r>
+              <a:rPr lang="en-US" sz="1300" dirty="0" smtClean="0"/>
+              <a:t>1 System should validated for transaction details (account and amount ) before transfer amount from one account to other account.</a:t>
+            </a:r>
+          </a:p>
+          <a:p>
+            <a:pPr marL="0" indent="0">
+              <a:buNone/>
+            </a:pPr>
+            <a:r>
+              <a:rPr lang="en-US" sz="1300" dirty="0"/>
+              <a:t>2</a:t>
+            </a:r>
+            <a:r>
+              <a:rPr lang="en-US" sz="1300" dirty="0" smtClean="0"/>
+              <a:t> System should provide some APIS to manager user account operation –GET/POST/DELETE </a:t>
+            </a:r>
+          </a:p>
+          <a:p>
+            <a:pPr marL="0" indent="0">
+              <a:buNone/>
+            </a:pPr>
+            <a:r>
+              <a:rPr lang="en-US" sz="1300" dirty="0"/>
+              <a:t>3</a:t>
+            </a:r>
+            <a:r>
+              <a:rPr lang="en-US" sz="1300" dirty="0" smtClean="0"/>
+              <a:t> System should support high concurrency and fault tolerant money transfer operation.</a:t>
+            </a:r>
+          </a:p>
+          <a:p>
+            <a:pPr marL="0" indent="0">
+              <a:buNone/>
+            </a:pPr>
+            <a:r>
+              <a:rPr lang="en-US" sz="1300" u="sng" dirty="0" smtClean="0"/>
+              <a:t>No Functional aspect :</a:t>
+            </a:r>
+          </a:p>
+          <a:p>
+            <a:pPr marL="0" indent="0">
+              <a:buNone/>
+            </a:pPr>
+            <a:r>
+              <a:rPr lang="en-US" sz="1300" dirty="0" smtClean="0"/>
+              <a:t>1. Application should support for cloud native deployment/management and can easy to scale </a:t>
+            </a:r>
+          </a:p>
+          <a:p>
+            <a:pPr marL="0" indent="0">
+              <a:buNone/>
+            </a:pPr>
+            <a:r>
+              <a:rPr lang="en-US" sz="1300" dirty="0" smtClean="0"/>
+              <a:t>2. Application should support system monitoring features like metrics , health check and so on </a:t>
+            </a:r>
+          </a:p>
+          <a:p>
+            <a:pPr marL="0" indent="0">
+              <a:buNone/>
+            </a:pPr>
+            <a:r>
+              <a:rPr lang="en-US" sz="1300" dirty="0" smtClean="0"/>
+              <a:t>3. Application should support valid exception mechanism   </a:t>
+            </a:r>
+          </a:p>
+          <a:p>
+            <a:pPr marL="0" indent="0">
+              <a:buNone/>
+            </a:pPr>
+            <a:r>
+              <a:rPr lang="en-US" sz="1300" dirty="0"/>
+              <a:t> </a:t>
+            </a:r>
+            <a:r>
+              <a:rPr lang="en-US" sz="1300" dirty="0" smtClean="0"/>
+              <a:t>  </a:t>
+            </a:r>
+            <a:endParaRPr lang="en-US" sz="1300" dirty="0"/>
           </a:p>
         </p:txBody>
       </p:sp>
     </p:spTree>
     <p:extLst>
       <p:ext uri="{BB962C8B-B14F-4D97-AF65-F5344CB8AC3E}">
-        <p14:creationId xmlns:p14="http://schemas.microsoft.com/office/powerpoint/2010/main" val="704206555"/>
+        <p14:creationId xmlns:p14="http://schemas.microsoft.com/office/powerpoint/2010/main" val="2923028439"/>
       </p:ext>
     </p:extLst>
   </p:cSld>
@@ -11163,6 +11721,70 @@
           <a:lstStyle/>
           <a:p>
             <a:r>
+              <a:rPr lang="en-US" dirty="0"/>
+              <a:t>Service implantation details</a:t>
+            </a:r>
+            <a:r>
+              <a:rPr lang="en-US" dirty="0" smtClean="0"/>
+              <a:t>	</a:t>
+            </a:r>
+            <a:endParaRPr lang="en-US" dirty="0"/>
+          </a:p>
+        </p:txBody>
+      </p:sp>
+    </p:spTree>
+    <p:extLst>
+      <p:ext uri="{BB962C8B-B14F-4D97-AF65-F5344CB8AC3E}">
+        <p14:creationId xmlns:p14="http://schemas.microsoft.com/office/powerpoint/2010/main" val="704206555"/>
+      </p:ext>
+    </p:extLst>
+  </p:cSld>
+  <p:clrMapOvr>
+    <a:masterClrMapping/>
+  </p:clrMapOvr>
+  <p:timing>
+    <p:tnLst>
+      <p:par>
+        <p:cTn id="1" dur="indefinite" restart="never" nodeType="tmRoot"/>
+      </p:par>
+    </p:tnLst>
+  </p:timing>
+</p:sld>
+</file>
+
+<file path=ppt/slides/slide7.xml><?xml version="1.0" encoding="utf-8"?>
+<p:sld xmlns:a="http://schemas.openxmlformats.org/drawingml/2006/main" xmlns:r="http://schemas.openxmlformats.org/officeDocument/2006/relationships" xmlns:p="http://schemas.openxmlformats.org/presentationml/2006/main">
+  <p:cSld>
+    <p:spTree>
+      <p:nvGrpSpPr>
+        <p:cNvPr id="1" name=""/>
+        <p:cNvGrpSpPr/>
+        <p:nvPr/>
+      </p:nvGrpSpPr>
+      <p:grpSpPr>
+        <a:xfrm>
+          <a:off x="0" y="0"/>
+          <a:ext cx="0" cy="0"/>
+          <a:chOff x="0" y="0"/>
+          <a:chExt cx="0" cy="0"/>
+        </a:xfrm>
+      </p:grpSpPr>
+      <p:sp>
+        <p:nvSpPr>
+          <p:cNvPr id="2" name="Title 1"/>
+          <p:cNvSpPr>
+            <a:spLocks noGrp="1"/>
+          </p:cNvSpPr>
+          <p:nvPr>
+            <p:ph type="title"/>
+          </p:nvPr>
+        </p:nvSpPr>
+        <p:spPr/>
+        <p:txBody>
+          <a:bodyPr/>
+          <a:lstStyle/>
+          <a:p>
+            <a:r>
               <a:rPr lang="en-US" dirty="0" smtClean="0"/>
               <a:t>Rest API documentation</a:t>
             </a:r>
@@ -11226,7 +11848,7 @@
           <a:graphicData uri="http://schemas.openxmlformats.org/presentationml/2006/ole">
             <mc:AlternateContent xmlns:mc="http://schemas.openxmlformats.org/markup-compatibility/2006">
               <mc:Choice xmlns:v="urn:schemas-microsoft-com:vml" Requires="v">
-                <p:oleObj spid="_x0000_s4102" name="Packager Shell Object" showAsIcon="1" r:id="rId3" imgW="893880" imgH="437760" progId="Package">
+                <p:oleObj spid="_x0000_s4107" name="Packager Shell Object" showAsIcon="1" r:id="rId3" imgW="893880" imgH="437760" progId="Package">
                   <p:embed/>
                 </p:oleObj>
               </mc:Choice>
@@ -11318,7 +11940,7 @@
 </p:sld>
 </file>
 
-<file path=ppt/slides/slide7.xml><?xml version="1.0" encoding="utf-8"?>
+<file path=ppt/slides/slide8.xml><?xml version="1.0" encoding="utf-8"?>
 <p:sld xmlns:a="http://schemas.openxmlformats.org/drawingml/2006/main" xmlns:r="http://schemas.openxmlformats.org/officeDocument/2006/relationships" xmlns:p="http://schemas.openxmlformats.org/presentationml/2006/main">
   <p:cSld>
     <p:spTree>
@@ -11457,526 +12079,6 @@
 </p:sld>
 </file>
 
-<file path=ppt/slides/slide8.xml><?xml version="1.0" encoding="utf-8"?>
-<p:sld xmlns:a="http://schemas.openxmlformats.org/drawingml/2006/main" xmlns:r="http://schemas.openxmlformats.org/officeDocument/2006/relationships" xmlns:p="http://schemas.openxmlformats.org/presentationml/2006/main">
-  <p:cSld>
-    <p:spTree>
-      <p:nvGrpSpPr>
-        <p:cNvPr id="1" name=""/>
-        <p:cNvGrpSpPr/>
-        <p:nvPr/>
-      </p:nvGrpSpPr>
-      <p:grpSpPr>
-        <a:xfrm>
-          <a:off x="0" y="0"/>
-          <a:ext cx="0" cy="0"/>
-          <a:chOff x="0" y="0"/>
-          <a:chExt cx="0" cy="0"/>
-        </a:xfrm>
-      </p:grpSpPr>
-      <p:sp>
-        <p:nvSpPr>
-          <p:cNvPr id="2" name="Title 1"/>
-          <p:cNvSpPr>
-            <a:spLocks noGrp="1"/>
-          </p:cNvSpPr>
-          <p:nvPr>
-            <p:ph type="title"/>
-          </p:nvPr>
-        </p:nvSpPr>
-        <p:spPr/>
-        <p:txBody>
-          <a:bodyPr/>
-          <a:lstStyle/>
-          <a:p>
-            <a:r>
-              <a:rPr lang="en-US" dirty="0"/>
-              <a:t>Dev Build, Release, Run</a:t>
-            </a:r>
-          </a:p>
-        </p:txBody>
-      </p:sp>
-      <p:sp>
-        <p:nvSpPr>
-          <p:cNvPr id="3" name="Content Placeholder 2"/>
-          <p:cNvSpPr>
-            <a:spLocks noGrp="1"/>
-          </p:cNvSpPr>
-          <p:nvPr>
-            <p:ph idx="1"/>
-          </p:nvPr>
-        </p:nvSpPr>
-        <p:spPr>
-          <a:xfrm>
-            <a:off x="677334" y="1364343"/>
-            <a:ext cx="8596668" cy="4677019"/>
-          </a:xfrm>
-        </p:spPr>
-        <p:txBody>
-          <a:bodyPr>
-            <a:normAutofit fontScale="85000" lnSpcReduction="20000"/>
-          </a:bodyPr>
-          <a:lstStyle/>
-          <a:p>
-            <a:r>
-              <a:rPr lang="en-US" dirty="0" smtClean="0"/>
-              <a:t>Step 2. Create Docker image and push it into local repository</a:t>
-            </a:r>
-          </a:p>
-          <a:p>
-            <a:pPr marL="0" indent="0">
-              <a:buNone/>
-            </a:pPr>
-            <a:r>
-              <a:rPr lang="en-US" dirty="0" smtClean="0"/>
-              <a:t>Application has at root level </a:t>
-            </a:r>
-            <a:r>
-              <a:rPr lang="en-US" dirty="0" err="1" smtClean="0"/>
-              <a:t>Dockerfile</a:t>
-            </a:r>
-            <a:r>
-              <a:rPr lang="en-US" dirty="0" smtClean="0"/>
-              <a:t> which used to create </a:t>
-            </a:r>
-            <a:r>
-              <a:rPr lang="en-US" dirty="0" err="1" smtClean="0"/>
-              <a:t>docker</a:t>
-            </a:r>
-            <a:r>
-              <a:rPr lang="en-US" dirty="0" smtClean="0"/>
-              <a:t> image </a:t>
-            </a:r>
-          </a:p>
-          <a:p>
-            <a:endParaRPr lang="en-US" dirty="0"/>
-          </a:p>
-          <a:p>
-            <a:pPr marL="0" indent="0">
-              <a:buNone/>
-            </a:pPr>
-            <a:r>
-              <a:rPr lang="en-US" dirty="0" smtClean="0"/>
-              <a:t>Used </a:t>
-            </a:r>
-            <a:r>
-              <a:rPr lang="en-US" altLang="en-US" dirty="0" smtClean="0">
-                <a:solidFill>
-                  <a:srgbClr val="000000"/>
-                </a:solidFill>
-                <a:latin typeface="Inconsolata"/>
-              </a:rPr>
-              <a:t>openjdk:8-jdk-alpine as base image </a:t>
-            </a:r>
-          </a:p>
-          <a:p>
-            <a:pPr marL="0" indent="0">
-              <a:buNone/>
-            </a:pPr>
-            <a:r>
-              <a:rPr lang="en-US" dirty="0" smtClean="0">
-                <a:solidFill>
-                  <a:srgbClr val="000000"/>
-                </a:solidFill>
-                <a:latin typeface="Inconsolata"/>
-              </a:rPr>
-              <a:t>Used native using </a:t>
-            </a:r>
-            <a:r>
-              <a:rPr lang="en-US" dirty="0" err="1" smtClean="0">
-                <a:solidFill>
-                  <a:srgbClr val="000000"/>
-                </a:solidFill>
-                <a:latin typeface="Inconsolata"/>
-              </a:rPr>
-              <a:t>docker</a:t>
-            </a:r>
-            <a:r>
-              <a:rPr lang="en-US" dirty="0" smtClean="0">
-                <a:solidFill>
-                  <a:srgbClr val="000000"/>
-                </a:solidFill>
-                <a:latin typeface="Inconsolata"/>
-              </a:rPr>
-              <a:t> copy command</a:t>
-            </a:r>
-          </a:p>
-          <a:p>
-            <a:pPr marL="0" indent="0">
-              <a:buNone/>
-            </a:pPr>
-            <a:r>
-              <a:rPr lang="en-US" altLang="en-US" dirty="0" smtClean="0">
-                <a:solidFill>
-                  <a:srgbClr val="000000"/>
-                </a:solidFill>
-                <a:latin typeface="Inconsolata"/>
-              </a:rPr>
-              <a:t>build</a:t>
-            </a:r>
-            <a:r>
-              <a:rPr lang="en-US" altLang="en-US" b="1" dirty="0" smtClean="0">
-                <a:solidFill>
-                  <a:srgbClr val="000080"/>
-                </a:solidFill>
-                <a:latin typeface="Inconsolata"/>
-              </a:rPr>
-              <a:t>/</a:t>
-            </a:r>
-            <a:r>
-              <a:rPr lang="en-US" altLang="en-US" dirty="0" smtClean="0">
-                <a:solidFill>
-                  <a:srgbClr val="000000"/>
-                </a:solidFill>
-                <a:latin typeface="Inconsolata"/>
-              </a:rPr>
-              <a:t>libs</a:t>
-            </a:r>
-            <a:r>
-              <a:rPr lang="en-US" altLang="en-US" b="1" dirty="0" smtClean="0">
-                <a:solidFill>
-                  <a:srgbClr val="000080"/>
-                </a:solidFill>
-                <a:latin typeface="Inconsolata"/>
-              </a:rPr>
-              <a:t>/</a:t>
-            </a:r>
-            <a:r>
-              <a:rPr lang="en-US" altLang="en-US" dirty="0" smtClean="0">
-                <a:solidFill>
-                  <a:srgbClr val="000000"/>
-                </a:solidFill>
-                <a:latin typeface="Inconsolata"/>
-              </a:rPr>
-              <a:t>challenge-0</a:t>
-            </a:r>
-            <a:r>
-              <a:rPr lang="en-US" altLang="en-US" dirty="0" smtClean="0">
-                <a:solidFill>
-                  <a:srgbClr val="0000FF"/>
-                </a:solidFill>
-                <a:latin typeface="Inconsolata"/>
-              </a:rPr>
-              <a:t>.0.1</a:t>
-            </a:r>
-            <a:r>
-              <a:rPr lang="en-US" altLang="en-US" b="1" dirty="0" smtClean="0">
-                <a:solidFill>
-                  <a:srgbClr val="000080"/>
-                </a:solidFill>
-                <a:latin typeface="Inconsolata"/>
-              </a:rPr>
-              <a:t>-</a:t>
-            </a:r>
-            <a:r>
-              <a:rPr lang="en-US" altLang="en-US" dirty="0" smtClean="0">
-                <a:solidFill>
-                  <a:srgbClr val="000000"/>
-                </a:solidFill>
-                <a:latin typeface="Inconsolata"/>
-              </a:rPr>
-              <a:t>SNAPSHOT.jar </a:t>
-            </a:r>
-            <a:r>
-              <a:rPr lang="en-US" altLang="en-US" dirty="0">
-                <a:solidFill>
-                  <a:srgbClr val="000000"/>
-                </a:solidFill>
-                <a:latin typeface="Inconsolata"/>
-              </a:rPr>
-              <a:t>app.jar</a:t>
-            </a:r>
-            <a:endParaRPr lang="en-US" altLang="en-US" sz="3200" dirty="0">
-              <a:solidFill>
-                <a:schemeClr val="tx1"/>
-              </a:solidFill>
-              <a:latin typeface="Arial" panose="020B0604020202020204" pitchFamily="34" charset="0"/>
-            </a:endParaRPr>
-          </a:p>
-          <a:p>
-            <a:pPr marL="0" indent="0">
-              <a:buNone/>
-            </a:pPr>
-            <a:r>
-              <a:rPr lang="en-US" dirty="0" smtClean="0">
-                <a:solidFill>
-                  <a:srgbClr val="000000"/>
-                </a:solidFill>
-                <a:latin typeface="Inconsolata"/>
-              </a:rPr>
-              <a:t>Ports are exposed from Docker file </a:t>
-            </a:r>
-          </a:p>
-          <a:p>
-            <a:pPr>
-              <a:buFont typeface="Wingdings" panose="05000000000000000000" pitchFamily="2" charset="2"/>
-              <a:buChar char="ü"/>
-            </a:pPr>
-            <a:r>
-              <a:rPr lang="en-US" b="1" u="sng" dirty="0" smtClean="0">
-                <a:solidFill>
-                  <a:srgbClr val="000000"/>
-                </a:solidFill>
-                <a:effectLst>
-                  <a:outerShdw blurRad="38100" dist="38100" dir="2700000" algn="tl">
-                    <a:srgbClr val="000000">
-                      <a:alpha val="43137"/>
-                    </a:srgbClr>
-                  </a:outerShdw>
-                </a:effectLst>
-                <a:latin typeface="Inconsolata"/>
-              </a:rPr>
-              <a:t>Unit test result of Docker file ? YES find below steps </a:t>
-            </a:r>
-          </a:p>
-          <a:p>
-            <a:pPr marL="0" indent="0">
-              <a:buNone/>
-            </a:pPr>
-            <a:r>
-              <a:rPr lang="en-US" dirty="0" smtClean="0">
-                <a:solidFill>
-                  <a:srgbClr val="000000"/>
-                </a:solidFill>
-                <a:latin typeface="Inconsolata"/>
-              </a:rPr>
-              <a:t>1. Run above </a:t>
-            </a:r>
-            <a:r>
-              <a:rPr lang="en-US" dirty="0" err="1" smtClean="0">
-                <a:solidFill>
-                  <a:srgbClr val="000000"/>
-                </a:solidFill>
-                <a:latin typeface="Inconsolata"/>
-              </a:rPr>
-              <a:t>docker</a:t>
-            </a:r>
-            <a:r>
-              <a:rPr lang="en-US" dirty="0" smtClean="0">
-                <a:solidFill>
-                  <a:srgbClr val="000000"/>
-                </a:solidFill>
-                <a:latin typeface="Inconsolata"/>
-              </a:rPr>
-              <a:t> file using command </a:t>
-            </a:r>
-            <a:r>
-              <a:rPr lang="en-US" dirty="0" err="1" smtClean="0">
-                <a:solidFill>
-                  <a:srgbClr val="000000"/>
-                </a:solidFill>
-                <a:latin typeface="Inconsolata"/>
-              </a:rPr>
-              <a:t>docker</a:t>
-            </a:r>
-            <a:r>
-              <a:rPr lang="en-US" dirty="0" smtClean="0">
-                <a:solidFill>
-                  <a:srgbClr val="000000"/>
-                </a:solidFill>
-                <a:latin typeface="Inconsolata"/>
-              </a:rPr>
-              <a:t> build –t </a:t>
-            </a:r>
-            <a:r>
-              <a:rPr lang="en-US" b="1" dirty="0" err="1" smtClean="0"/>
-              <a:t>minkube</a:t>
-            </a:r>
-            <a:r>
-              <a:rPr lang="en-US" b="1" dirty="0" smtClean="0"/>
-              <a:t>-accounts-service</a:t>
-            </a:r>
-            <a:r>
-              <a:rPr lang="en-US" dirty="0" smtClean="0"/>
-              <a:t> ./ </a:t>
-            </a:r>
-          </a:p>
-          <a:p>
-            <a:pPr marL="0" indent="0">
-              <a:buNone/>
-            </a:pPr>
-            <a:r>
-              <a:rPr lang="en-US" dirty="0" smtClean="0"/>
-              <a:t>2 . Run </a:t>
-            </a:r>
-            <a:r>
-              <a:rPr lang="en-US" dirty="0" err="1" smtClean="0"/>
-              <a:t>docker</a:t>
-            </a:r>
-            <a:r>
-              <a:rPr lang="en-US" dirty="0" smtClean="0"/>
-              <a:t> image using command </a:t>
-            </a:r>
-            <a:r>
-              <a:rPr lang="en-US" dirty="0" err="1" smtClean="0"/>
-              <a:t>docker</a:t>
-            </a:r>
-            <a:r>
-              <a:rPr lang="en-US" dirty="0" smtClean="0"/>
-              <a:t> run –p 8080:8080 </a:t>
-            </a:r>
-            <a:r>
-              <a:rPr lang="en-US" b="1" dirty="0" err="1" smtClean="0"/>
-              <a:t>minkube-accounts-service:leatest</a:t>
-            </a:r>
-            <a:endParaRPr lang="en-US" b="1" dirty="0" smtClean="0"/>
-          </a:p>
-          <a:p>
-            <a:pPr marL="0" indent="0">
-              <a:buNone/>
-            </a:pPr>
-            <a:r>
-              <a:rPr lang="en-US" b="1" i="1" dirty="0" smtClean="0"/>
-              <a:t>Verified health </a:t>
-            </a:r>
-            <a:r>
-              <a:rPr lang="en-US" b="1" i="1" dirty="0" err="1" smtClean="0"/>
-              <a:t>api</a:t>
-            </a:r>
-            <a:r>
-              <a:rPr lang="en-US" b="1" i="1" dirty="0" smtClean="0"/>
-              <a:t> and normal operations of service working – DONE </a:t>
-            </a:r>
-          </a:p>
-          <a:p>
-            <a:pPr marL="0" indent="0">
-              <a:buNone/>
-            </a:pPr>
-            <a:endParaRPr lang="en-US" i="1" dirty="0" smtClean="0"/>
-          </a:p>
-          <a:p>
-            <a:pPr marL="0" indent="0">
-              <a:buNone/>
-            </a:pPr>
-            <a:r>
-              <a:rPr lang="en-US" b="1" dirty="0" smtClean="0">
-                <a:solidFill>
-                  <a:srgbClr val="FF0000"/>
-                </a:solidFill>
-                <a:latin typeface="Inconsolata"/>
-              </a:rPr>
-              <a:t>NOTE : </a:t>
-            </a:r>
-          </a:p>
-          <a:p>
-            <a:pPr marL="0" indent="0">
-              <a:buNone/>
-            </a:pPr>
-            <a:r>
-              <a:rPr lang="en-US" dirty="0" smtClean="0">
-                <a:solidFill>
-                  <a:srgbClr val="000000"/>
-                </a:solidFill>
-                <a:latin typeface="Inconsolata"/>
-              </a:rPr>
-              <a:t>Above command pushed image in local </a:t>
-            </a:r>
-            <a:r>
-              <a:rPr lang="en-US" dirty="0">
-                <a:solidFill>
-                  <a:srgbClr val="000000"/>
-                </a:solidFill>
-                <a:latin typeface="Inconsolata"/>
-              </a:rPr>
-              <a:t>D</a:t>
-            </a:r>
-            <a:r>
-              <a:rPr lang="en-US" dirty="0" smtClean="0">
-                <a:solidFill>
-                  <a:srgbClr val="000000"/>
-                </a:solidFill>
-                <a:latin typeface="Inconsolata"/>
-              </a:rPr>
-              <a:t>ocker repository to access it in </a:t>
-            </a:r>
-            <a:r>
-              <a:rPr lang="en-US" b="1" dirty="0" err="1" smtClean="0">
-                <a:solidFill>
-                  <a:srgbClr val="000000"/>
-                </a:solidFill>
-                <a:latin typeface="Inconsolata"/>
-              </a:rPr>
-              <a:t>Minikube</a:t>
-            </a:r>
-            <a:r>
-              <a:rPr lang="en-US" dirty="0" smtClean="0">
-                <a:solidFill>
-                  <a:srgbClr val="000000"/>
-                </a:solidFill>
-                <a:latin typeface="Inconsolata"/>
-              </a:rPr>
-              <a:t> required some settings to pulling local </a:t>
-            </a:r>
-            <a:r>
-              <a:rPr lang="en-US" dirty="0">
-                <a:solidFill>
-                  <a:srgbClr val="000000"/>
-                </a:solidFill>
-                <a:latin typeface="Inconsolata"/>
-              </a:rPr>
-              <a:t>D</a:t>
-            </a:r>
-            <a:r>
-              <a:rPr lang="en-US" dirty="0" smtClean="0">
-                <a:solidFill>
-                  <a:srgbClr val="000000"/>
-                </a:solidFill>
-                <a:latin typeface="Inconsolata"/>
-              </a:rPr>
-              <a:t>ocker REPO image in K8s then refer [https</a:t>
-            </a:r>
-            <a:r>
-              <a:rPr lang="en-US" dirty="0">
-                <a:solidFill>
-                  <a:srgbClr val="000000"/>
-                </a:solidFill>
-                <a:latin typeface="Inconsolata"/>
-              </a:rPr>
-              <a:t>://minikube.sigs.k8s.io/docs/handbook/pushing</a:t>
-            </a:r>
-            <a:r>
-              <a:rPr lang="en-US" dirty="0" smtClean="0">
-                <a:solidFill>
-                  <a:srgbClr val="000000"/>
-                </a:solidFill>
-                <a:latin typeface="Inconsolata"/>
-              </a:rPr>
-              <a:t>/] </a:t>
-            </a:r>
-          </a:p>
-          <a:p>
-            <a:endParaRPr lang="en-US" dirty="0">
-              <a:solidFill>
-                <a:srgbClr val="000000"/>
-              </a:solidFill>
-              <a:latin typeface="Inconsolata"/>
-            </a:endParaRPr>
-          </a:p>
-          <a:p>
-            <a:endParaRPr lang="en-US" dirty="0"/>
-          </a:p>
-        </p:txBody>
-      </p:sp>
-    </p:spTree>
-    <p:extLst>
-      <p:ext uri="{BB962C8B-B14F-4D97-AF65-F5344CB8AC3E}">
-        <p14:creationId xmlns:p14="http://schemas.microsoft.com/office/powerpoint/2010/main" val="2052624250"/>
-      </p:ext>
-    </p:extLst>
-  </p:cSld>
-  <p:clrMapOvr>
-    <a:masterClrMapping/>
-  </p:clrMapOvr>
-  <p:timing>
-    <p:tnLst>
-      <p:par>
-        <p:cTn id="1" dur="indefinite" restart="never" nodeType="tmRoot"/>
-      </p:par>
-    </p:tnLst>
-  </p:timing>
-</p:sld>
-</file>
-
 <file path=ppt/slides/slide9.xml><?xml version="1.0" encoding="utf-8"?>
 <p:sld xmlns:a="http://schemas.openxmlformats.org/drawingml/2006/main" xmlns:r="http://schemas.openxmlformats.org/officeDocument/2006/relationships" xmlns:p="http://schemas.openxmlformats.org/presentationml/2006/main">
   <p:cSld>
@@ -12026,32 +12128,67 @@
             <p:ph idx="1"/>
           </p:nvPr>
         </p:nvSpPr>
-        <p:spPr/>
+        <p:spPr>
+          <a:xfrm>
+            <a:off x="677334" y="1364343"/>
+            <a:ext cx="8596668" cy="4677019"/>
+          </a:xfrm>
+        </p:spPr>
         <p:txBody>
           <a:bodyPr>
-            <a:normAutofit/>
+            <a:normAutofit fontScale="85000" lnSpcReduction="20000"/>
           </a:bodyPr>
           <a:lstStyle/>
           <a:p>
             <a:r>
               <a:rPr lang="en-US" dirty="0" smtClean="0"/>
-              <a:t>Step 3. </a:t>
+              <a:t>Step 2. Create Docker image and push it into local repository</a:t>
+            </a:r>
+          </a:p>
+          <a:p>
+            <a:pPr marL="0" indent="0">
+              <a:buNone/>
+            </a:pPr>
+            <a:r>
+              <a:rPr lang="en-US" dirty="0" smtClean="0"/>
+              <a:t>Application has at root level </a:t>
             </a:r>
             <a:r>
               <a:rPr lang="en-US" dirty="0" err="1" smtClean="0"/>
-              <a:t>Kubernates</a:t>
+              <a:t>Dockerfile</a:t>
             </a:r>
             <a:r>
               <a:rPr lang="en-US" dirty="0" smtClean="0"/>
-              <a:t> deployment using local </a:t>
+              <a:t> which used to create </a:t>
             </a:r>
             <a:r>
               <a:rPr lang="en-US" dirty="0" err="1" smtClean="0"/>
-              <a:t>Minikube</a:t>
+              <a:t>docker</a:t>
             </a:r>
             <a:r>
               <a:rPr lang="en-US" dirty="0" smtClean="0"/>
-              <a:t> cluster </a:t>
+              <a:t> image </a:t>
+            </a:r>
+          </a:p>
+          <a:p>
+            <a:endParaRPr lang="en-US" dirty="0"/>
+          </a:p>
+          <a:p>
+            <a:pPr marL="0" indent="0">
+              <a:buNone/>
+            </a:pPr>
+            <a:r>
+              <a:rPr lang="en-US" dirty="0" smtClean="0"/>
+              <a:t>Used </a:t>
+            </a:r>
+            <a:r>
+              <a:rPr lang="en-US" altLang="en-US" dirty="0" smtClean="0">
+                <a:solidFill>
+                  <a:srgbClr val="000000"/>
+                </a:solidFill>
+                <a:latin typeface="Inconsolata"/>
+              </a:rPr>
+              <a:t>openjdk:8-jdk-alpine as base image </a:t>
             </a:r>
           </a:p>
           <a:p>
@@ -12065,13 +12202,17 @@
                 </a:solidFill>
                 <a:latin typeface="Inconsolata"/>
               </a:rPr>
-              <a:t>Application has deployment folder in future we can add different configuration and setting per environment to easily cover configuration aspect of cloud native app development </a:t>
-            </a:r>
-          </a:p>
-          <a:p>
-            <a:pPr marL="0" indent="0">
-              <a:buNone/>
-            </a:pPr>
+              <a:t>Used native using </a:t>
+            </a:r>
+            <a:r>
+              <a:rPr lang="en-US" dirty="0" err="1" smtClean="0">
+                <a:solidFill>
+                  <a:srgbClr val="000000"/>
+                </a:solidFill>
+                <a:latin typeface="Inconsolata"/>
+              </a:rPr>
+              <a:t>docker</a:t>
+            </a:r>
             <a:r>
               <a:rPr lang="en-US" dirty="0" smtClean="0">
                 <a:solidFill>
@@ -12079,16 +12220,149 @@
                 </a:solidFill>
                 <a:latin typeface="Inconsolata"/>
               </a:rPr>
-              <a:t>After setup and locally running </a:t>
-            </a:r>
-            <a:r>
-              <a:rPr lang="en-US" dirty="0" err="1">
+              <a:t> copy command</a:t>
+            </a:r>
+          </a:p>
+          <a:p>
+            <a:pPr marL="0" indent="0">
+              <a:buNone/>
+            </a:pPr>
+            <a:r>
+              <a:rPr lang="en-US" altLang="en-US" dirty="0" smtClean="0">
                 <a:solidFill>
                   <a:srgbClr val="000000"/>
                 </a:solidFill>
                 <a:latin typeface="Inconsolata"/>
               </a:rPr>
-              <a:t>M</a:t>
+              <a:t>build</a:t>
+            </a:r>
+            <a:r>
+              <a:rPr lang="en-US" altLang="en-US" b="1" dirty="0" smtClean="0">
+                <a:solidFill>
+                  <a:srgbClr val="000080"/>
+                </a:solidFill>
+                <a:latin typeface="Inconsolata"/>
+              </a:rPr>
+              <a:t>/</a:t>
+            </a:r>
+            <a:r>
+              <a:rPr lang="en-US" altLang="en-US" dirty="0" smtClean="0">
+                <a:solidFill>
+                  <a:srgbClr val="000000"/>
+                </a:solidFill>
+                <a:latin typeface="Inconsolata"/>
+              </a:rPr>
+              <a:t>libs</a:t>
+            </a:r>
+            <a:r>
+              <a:rPr lang="en-US" altLang="en-US" b="1" dirty="0" smtClean="0">
+                <a:solidFill>
+                  <a:srgbClr val="000080"/>
+                </a:solidFill>
+                <a:latin typeface="Inconsolata"/>
+              </a:rPr>
+              <a:t>/</a:t>
+            </a:r>
+            <a:r>
+              <a:rPr lang="en-US" altLang="en-US" dirty="0" smtClean="0">
+                <a:solidFill>
+                  <a:srgbClr val="000000"/>
+                </a:solidFill>
+                <a:latin typeface="Inconsolata"/>
+              </a:rPr>
+              <a:t>challenge-0</a:t>
+            </a:r>
+            <a:r>
+              <a:rPr lang="en-US" altLang="en-US" dirty="0" smtClean="0">
+                <a:solidFill>
+                  <a:srgbClr val="0000FF"/>
+                </a:solidFill>
+                <a:latin typeface="Inconsolata"/>
+              </a:rPr>
+              <a:t>.0.1</a:t>
+            </a:r>
+            <a:r>
+              <a:rPr lang="en-US" altLang="en-US" b="1" dirty="0" smtClean="0">
+                <a:solidFill>
+                  <a:srgbClr val="000080"/>
+                </a:solidFill>
+                <a:latin typeface="Inconsolata"/>
+              </a:rPr>
+              <a:t>-</a:t>
+            </a:r>
+            <a:r>
+              <a:rPr lang="en-US" altLang="en-US" dirty="0" smtClean="0">
+                <a:solidFill>
+                  <a:srgbClr val="000000"/>
+                </a:solidFill>
+                <a:latin typeface="Inconsolata"/>
+              </a:rPr>
+              <a:t>SNAPSHOT.jar </a:t>
+            </a:r>
+            <a:r>
+              <a:rPr lang="en-US" altLang="en-US" dirty="0">
+                <a:solidFill>
+                  <a:srgbClr val="000000"/>
+                </a:solidFill>
+                <a:latin typeface="Inconsolata"/>
+              </a:rPr>
+              <a:t>app.jar</a:t>
+            </a:r>
+            <a:endParaRPr lang="en-US" altLang="en-US" sz="3200" dirty="0">
+              <a:solidFill>
+                <a:schemeClr val="tx1"/>
+              </a:solidFill>
+              <a:latin typeface="Arial" panose="020B0604020202020204" pitchFamily="34" charset="0"/>
+            </a:endParaRPr>
+          </a:p>
+          <a:p>
+            <a:pPr marL="0" indent="0">
+              <a:buNone/>
+            </a:pPr>
+            <a:r>
+              <a:rPr lang="en-US" dirty="0" smtClean="0">
+                <a:solidFill>
+                  <a:srgbClr val="000000"/>
+                </a:solidFill>
+                <a:latin typeface="Inconsolata"/>
+              </a:rPr>
+              <a:t>Ports are exposed from Docker file </a:t>
+            </a:r>
+          </a:p>
+          <a:p>
+            <a:pPr>
+              <a:buFont typeface="Wingdings" panose="05000000000000000000" pitchFamily="2" charset="2"/>
+              <a:buChar char="ü"/>
+            </a:pPr>
+            <a:r>
+              <a:rPr lang="en-US" b="1" u="sng" dirty="0" smtClean="0">
+                <a:solidFill>
+                  <a:srgbClr val="000000"/>
+                </a:solidFill>
+                <a:effectLst>
+                  <a:outerShdw blurRad="38100" dist="38100" dir="2700000" algn="tl">
+                    <a:srgbClr val="000000">
+                      <a:alpha val="43137"/>
+                    </a:srgbClr>
+                  </a:outerShdw>
+                </a:effectLst>
+                <a:latin typeface="Inconsolata"/>
+              </a:rPr>
+              <a:t>Unit test result of Docker file ? YES find below steps </a:t>
+            </a:r>
+          </a:p>
+          <a:p>
+            <a:pPr marL="0" indent="0">
+              <a:buNone/>
+            </a:pPr>
+            <a:r>
+              <a:rPr lang="en-US" dirty="0" smtClean="0">
+                <a:solidFill>
+                  <a:srgbClr val="000000"/>
+                </a:solidFill>
+                <a:latin typeface="Inconsolata"/>
+              </a:rPr>
+              <a:t>1. Run above </a:t>
             </a:r>
             <a:r>
               <a:rPr lang="en-US" dirty="0" err="1" smtClean="0">
@@ -12097,7 +12371,7 @@
                 </a:solidFill>
                 <a:latin typeface="Inconsolata"/>
               </a:rPr>
-              <a:t>inikube</a:t>
+              <a:t>docker</a:t>
             </a:r>
             <a:r>
               <a:rPr lang="en-US" dirty="0" smtClean="0">
@@ -12106,10 +12380,17 @@
                 </a:solidFill>
                 <a:latin typeface="Inconsolata"/>
               </a:rPr>
-              <a:t> cluster below command executed to deploy app in cluster environment </a:t>
-            </a:r>
-          </a:p>
-          <a:p>
+              <a:t> file using command </a:t>
+            </a:r>
+            <a:r>
+              <a:rPr lang="en-US" dirty="0" err="1" smtClean="0">
+                <a:solidFill>
+                  <a:srgbClr val="000000"/>
+                </a:solidFill>
+                <a:latin typeface="Inconsolata"/>
+              </a:rPr>
+              <a:t>docker</a:t>
+            </a:r>
             <a:r>
               <a:rPr lang="en-US" dirty="0" smtClean="0">
                 <a:solidFill>
@@ -12117,17 +12398,92 @@
                 </a:solidFill>
                 <a:latin typeface="Inconsolata"/>
               </a:rPr>
-              <a:t>1. </a:t>
-            </a:r>
-            <a:r>
-              <a:rPr lang="en-US" dirty="0" err="1" smtClean="0">
+              <a:t> build –t </a:t>
+            </a:r>
+            <a:r>
+              <a:rPr lang="en-US" b="1" dirty="0" err="1" smtClean="0"/>
+              <a:t>minkube</a:t>
+            </a:r>
+            <a:r>
+              <a:rPr lang="en-US" b="1" dirty="0" smtClean="0"/>
+              <a:t>-accounts-service</a:t>
+            </a:r>
+            <a:r>
+              <a:rPr lang="en-US" dirty="0" smtClean="0"/>
+              <a:t> ./ </a:t>
+            </a:r>
+          </a:p>
+          <a:p>
+            <a:pPr marL="0" indent="0">
+              <a:buNone/>
+            </a:pPr>
+            <a:r>
+              <a:rPr lang="en-US" dirty="0" smtClean="0"/>
+              <a:t>2 . Run </a:t>
+            </a:r>
+            <a:r>
+              <a:rPr lang="en-US" dirty="0" err="1" smtClean="0"/>
+              <a:t>docker</a:t>
+            </a:r>
+            <a:r>
+              <a:rPr lang="en-US" dirty="0" smtClean="0"/>
+              <a:t> image using command </a:t>
+            </a:r>
+            <a:r>
+              <a:rPr lang="en-US" dirty="0" err="1" smtClean="0"/>
+              <a:t>docker</a:t>
+            </a:r>
+            <a:r>
+              <a:rPr lang="en-US" dirty="0" smtClean="0"/>
+              <a:t> run –p 8080:8080 </a:t>
+            </a:r>
+            <a:r>
+              <a:rPr lang="en-US" b="1" dirty="0" err="1" smtClean="0"/>
+              <a:t>minkube-accounts-service:leatest</a:t>
+            </a:r>
+            <a:endParaRPr lang="en-US" b="1" dirty="0" smtClean="0"/>
+          </a:p>
+          <a:p>
+            <a:pPr marL="0" indent="0">
+              <a:buNone/>
+            </a:pPr>
+            <a:r>
+              <a:rPr lang="en-US" b="1" i="1" dirty="0" smtClean="0"/>
+              <a:t>Verified health </a:t>
+            </a:r>
+            <a:r>
+              <a:rPr lang="en-US" b="1" i="1" dirty="0" err="1" smtClean="0"/>
+              <a:t>api</a:t>
+            </a:r>
+            <a:r>
+              <a:rPr lang="en-US" b="1" i="1" dirty="0" smtClean="0"/>
+              <a:t> and normal operations of service working – DONE </a:t>
+            </a:r>
+          </a:p>
+          <a:p>
+            <a:pPr marL="0" indent="0">
+              <a:buNone/>
+            </a:pPr>
+            <a:endParaRPr lang="en-US" i="1" dirty="0" smtClean="0"/>
+          </a:p>
+          <a:p>
+            <a:pPr marL="0" indent="0">
+              <a:buNone/>
+            </a:pPr>
+            <a:r>
+              <a:rPr lang="en-US" b="1" dirty="0" smtClean="0">
                 <a:solidFill>
-                  <a:srgbClr val="000000"/>
+                  <a:srgbClr val="FF0000"/>
                 </a:solidFill>
                 <a:latin typeface="Inconsolata"/>
               </a:rPr>
-              <a:t>kubernates</a:t>
-            </a:r>
+              <a:t>NOTE : </a:t>
+            </a:r>
+          </a:p>
+          <a:p>
+            <a:pPr marL="0" indent="0">
+              <a:buNone/>
+            </a:pPr>
             <a:r>
               <a:rPr lang="en-US" dirty="0" smtClean="0">
                 <a:solidFill>
@@ -12135,10 +12491,17 @@
                 </a:solidFill>
                 <a:latin typeface="Inconsolata"/>
               </a:rPr>
-              <a:t> deployment </a:t>
-            </a:r>
-          </a:p>
-          <a:p>
+              <a:t>Above command pushed image in local </a:t>
+            </a:r>
+            <a:r>
+              <a:rPr lang="en-US" dirty="0">
+                <a:solidFill>
+                  <a:srgbClr val="000000"/>
+                </a:solidFill>
+                <a:latin typeface="Inconsolata"/>
+              </a:rPr>
+              <a:t>D</a:t>
+            </a:r>
             <a:r>
               <a:rPr lang="en-US" dirty="0" smtClean="0">
                 <a:solidFill>
@@ -12146,8 +12509,64 @@
                 </a:solidFill>
                 <a:latin typeface="Inconsolata"/>
               </a:rPr>
-              <a:t>2. Run application using service </a:t>
-            </a:r>
+              <a:t>ocker repository to access it in </a:t>
+            </a:r>
+            <a:r>
+              <a:rPr lang="en-US" b="1" dirty="0" err="1" smtClean="0">
+                <a:solidFill>
+                  <a:srgbClr val="000000"/>
+                </a:solidFill>
+                <a:latin typeface="Inconsolata"/>
+              </a:rPr>
+              <a:t>Minikube</a:t>
+            </a:r>
+            <a:r>
+              <a:rPr lang="en-US" dirty="0" smtClean="0">
+                <a:solidFill>
+                  <a:srgbClr val="000000"/>
+                </a:solidFill>
+                <a:latin typeface="Inconsolata"/>
+              </a:rPr>
+              <a:t> required some settings to pulling local </a:t>
+            </a:r>
+            <a:r>
+              <a:rPr lang="en-US" dirty="0">
+                <a:solidFill>
+                  <a:srgbClr val="000000"/>
+                </a:solidFill>
+                <a:latin typeface="Inconsolata"/>
+              </a:rPr>
+              <a:t>D</a:t>
+            </a:r>
+            <a:r>
+              <a:rPr lang="en-US" dirty="0" smtClean="0">
+                <a:solidFill>
+                  <a:srgbClr val="000000"/>
+                </a:solidFill>
+                <a:latin typeface="Inconsolata"/>
+              </a:rPr>
+              <a:t>ocker REPO image in K8s then refer [https</a:t>
+            </a:r>
+            <a:r>
+              <a:rPr lang="en-US" dirty="0">
+                <a:solidFill>
+                  <a:srgbClr val="000000"/>
+                </a:solidFill>
+                <a:latin typeface="Inconsolata"/>
+              </a:rPr>
+              <a:t>://minikube.sigs.k8s.io/docs/handbook/pushing</a:t>
+            </a:r>
+            <a:r>
+              <a:rPr lang="en-US" dirty="0" smtClean="0">
+                <a:solidFill>
+                  <a:srgbClr val="000000"/>
+                </a:solidFill>
+                <a:latin typeface="Inconsolata"/>
+              </a:rPr>
+              <a:t>/] </a:t>
+            </a:r>
+          </a:p>
+          <a:p>
             <a:endParaRPr lang="en-US" dirty="0">
               <a:solidFill>
                 <a:srgbClr val="000000"/>
@@ -12160,47 +12579,10 @@
           </a:p>
         </p:txBody>
       </p:sp>
-      <p:pic>
-        <p:nvPicPr>
-          <p:cNvPr id="4" name="Picture 3"/>
-          <p:cNvPicPr>
-            <a:picLocks noChangeAspect="1"/>
-          </p:cNvPicPr>
-          <p:nvPr/>
-        </p:nvPicPr>
-        <p:blipFill>
-          <a:blip r:embed="rId2"/>
-          <a:stretch>
-            <a:fillRect/>
-          </a:stretch>
-        </p:blipFill>
-        <p:spPr>
-          <a:xfrm>
-            <a:off x="1209675" y="5055398"/>
-            <a:ext cx="6610350" cy="1697827"/>
-          </a:xfrm>
-          <a:prstGeom prst="roundRect">
-            <a:avLst>
-              <a:gd name="adj" fmla="val 8594"/>
-            </a:avLst>
-          </a:prstGeom>
-          <a:solidFill>
-            <a:srgbClr val="FFFFFF">
-              <a:shade val="85000"/>
-            </a:srgbClr>
-          </a:solidFill>
-          <a:ln>
-            <a:noFill/>
-          </a:ln>
-          <a:effectLst>
-            <a:reflection blurRad="12700" stA="38000" endPos="28000" dist="5000" dir="5400000" sy="-100000" algn="bl" rotWithShape="0"/>
-          </a:effectLst>
-        </p:spPr>
-      </p:pic>
     </p:spTree>
     <p:extLst>
       <p:ext uri="{BB962C8B-B14F-4D97-AF65-F5344CB8AC3E}">
-        <p14:creationId xmlns:p14="http://schemas.microsoft.com/office/powerpoint/2010/main" val="1822290849"/>
+        <p14:creationId xmlns:p14="http://schemas.microsoft.com/office/powerpoint/2010/main" val="2052624250"/>
       </p:ext>
     </p:extLst>
   </p:cSld>

</xml_diff>